<commit_message>
tdf#136754: handle pptx chart backgrounds provided by the themes correctly
It seems that there is a small undocumented quirk in the OOXML spec
regarding pptx files. The first 32 themes are handled as if they would
be specifying a transparent background whereas the spec seems to agree
with the xlsx/docx handling of using a solid background based on the
theme colors.

This corresponds to table 3 in 21.2.3.46 ST_Style of the OOXML spec.

This commit also reverts the fix for tdf#60316.

Change-Id: I4187b5740898435941647056a5820fa47a2b3dba
Reviewed-on: https://gerrit.libreoffice.org/c/core/+/187759
Tested-by: Jenkins
Reviewed-by: Markus Mohrhard <markus.mohrhard@googlemail.com>
</commit_message>
<xml_diff>
--- a/chart2/qa/extras/data/pptx/tdf60316.pptx
+++ b/chart2/qa/extras/data/pptx/tdf60316.pptx
@@ -11,7 +11,7 @@
   <p:notesSz cx="6858000" cy="9144000"/>
   <p:defaultTextStyle>
     <a:defPPr>
-      <a:defRPr lang="zh-CN"/>
+      <a:defRPr lang="en-US"/>
     </a:defPPr>
     <a:lvl1pPr marL="0" algn="l" defTabSz="914400" rtl="0" eaLnBrk="1" latinLnBrk="0" hangingPunct="1">
       <a:defRPr sz="1800" kern="1200">
@@ -110,30 +110,68 @@
 <file path=ppt/charts/chart1.xml><?xml version="1.0" encoding="utf-8"?>
 <c:chartSpace xmlns:c="http://schemas.openxmlformats.org/drawingml/2006/chart" xmlns:a="http://schemas.openxmlformats.org/drawingml/2006/main" xmlns:r="http://schemas.openxmlformats.org/officeDocument/2006/relationships" xmlns:c16r2="http://schemas.microsoft.com/office/drawing/2015/06/chart">
   <c:date1904 val="0"/>
-  <c:lang val="en-US"/>
+  <c:lang val="de-DE"/>
   <c:roundedCorners val="0"/>
-  <mc:AlternateContent xmlns:mc="http://schemas.openxmlformats.org/markup-compatibility/2006">
-    <mc:Choice xmlns:c14="http://schemas.microsoft.com/office/drawing/2007/8/2/chart" Requires="c14">
-      <c14:style val="102"/>
-    </mc:Choice>
-    <mc:Fallback>
-      <c:style val="2"/>
-    </mc:Fallback>
-  </mc:AlternateContent>
+  <c:style val="2"/>
   <c:chart>
+    <c:title>
+      <c:tx>
+        <c:rich>
+          <a:bodyPr rot="0" spcFirstLastPara="1" vertOverflow="ellipsis" vert="horz" wrap="square" anchor="ctr" anchorCtr="1"/>
+          <a:lstStyle/>
+          <a:p>
+            <a:pPr>
+              <a:defRPr sz="1862" b="0" i="0" u="none" strike="noStrike" kern="1200" spc="0" baseline="0">
+                <a:solidFill>
+                  <a:schemeClr val="tx1">
+                    <a:lumMod val="65000"/>
+                    <a:lumOff val="35000"/>
+                  </a:schemeClr>
+                </a:solidFill>
+                <a:latin typeface="+mn-lt"/>
+                <a:ea typeface="+mn-ea"/>
+                <a:cs typeface="+mn-cs"/>
+              </a:defRPr>
+            </a:pPr>
+            <a:r>
+              <a:rPr lang="en-US" dirty="0"/>
+              <a:t>Title</a:t>
+            </a:r>
+          </a:p>
+        </c:rich>
+      </c:tx>
+      <c:overlay val="0"/>
+      <c:spPr>
+        <a:noFill/>
+        <a:ln>
+          <a:noFill/>
+        </a:ln>
+        <a:effectLst/>
+      </c:spPr>
+      <c:txPr>
+        <a:bodyPr rot="0" spcFirstLastPara="1" vertOverflow="ellipsis" vert="horz" wrap="square" anchor="ctr" anchorCtr="1"/>
+        <a:lstStyle/>
+        <a:p>
+          <a:pPr>
+            <a:defRPr sz="1862" b="0" i="0" u="none" strike="noStrike" kern="1200" spc="0" baseline="0">
+              <a:solidFill>
+                <a:schemeClr val="tx1">
+                  <a:lumMod val="65000"/>
+                  <a:lumOff val="35000"/>
+                </a:schemeClr>
+              </a:solidFill>
+              <a:latin typeface="+mn-lt"/>
+              <a:ea typeface="+mn-ea"/>
+              <a:cs typeface="+mn-cs"/>
+            </a:defRPr>
+          </a:pPr>
+          <a:endParaRPr lang="en-US"/>
+        </a:p>
+      </c:txPr>
+    </c:title>
     <c:autoTitleDeleted val="0"/>
     <c:plotArea>
-      <c:layout>
-        <c:manualLayout>
-          <c:layoutTarget val="inner"/>
-          <c:xMode val="edge"/>
-          <c:yMode val="edge"/>
-          <c:x val="7.2739665354330713E-2"/>
-          <c:y val="0.14929303160564586"/>
-          <c:w val="0.92352903543307086"/>
-          <c:h val="0.6614107251675807"/>
-        </c:manualLayout>
-      </c:layout>
+      <c:layout/>
       <c:barChart>
         <c:barDir val="col"/>
         <c:grouping val="clustered"/>
@@ -143,84 +181,48 @@
           <c:order val="0"/>
           <c:tx>
             <c:strRef>
-              <c:f>Sheet1!$B$1</c:f>
+              <c:f>Tabelle1!$B$1</c:f>
               <c:strCache>
                 <c:ptCount val="1"/>
                 <c:pt idx="0">
-                  <c:v>value 1</c:v>
+                  <c:v>row1</c:v>
                 </c:pt>
               </c:strCache>
             </c:strRef>
           </c:tx>
           <c:spPr>
             <a:solidFill>
-              <a:srgbClr val="6CAAB3">
-                <a:alpha val="60000"/>
-              </a:srgbClr>
+              <a:schemeClr val="accent1"/>
             </a:solidFill>
+            <a:ln>
+              <a:noFill/>
+            </a:ln>
+            <a:effectLst/>
           </c:spPr>
           <c:invertIfNegative val="0"/>
-          <c:dLbls>
-            <c:spPr>
-              <a:noFill/>
-              <a:ln>
-                <a:noFill/>
-              </a:ln>
-              <a:effectLst/>
-            </c:spPr>
-            <c:txPr>
-              <a:bodyPr/>
-              <a:lstStyle/>
-              <a:p>
-                <a:pPr>
-                  <a:defRPr sz="1200" b="1">
-                    <a:solidFill>
-                      <a:srgbClr val="6CAAB3"/>
-                    </a:solidFill>
-                    <a:latin typeface="Tahoma" panose="020B0604030504040204" pitchFamily="34" charset="0"/>
-                    <a:ea typeface="Tahoma" panose="020B0604030504040204" pitchFamily="34" charset="0"/>
-                    <a:cs typeface="Tahoma" panose="020B0604030504040204" pitchFamily="34" charset="0"/>
-                  </a:defRPr>
-                </a:pPr>
-                <a:endParaRPr lang="zh-CN"/>
-              </a:p>
-            </c:txPr>
-            <c:showLegendKey val="0"/>
-            <c:showVal val="1"/>
-            <c:showCatName val="0"/>
-            <c:showSerName val="0"/>
-            <c:showPercent val="0"/>
-            <c:showBubbleSize val="0"/>
-            <c:showLeaderLines val="0"/>
-            <c:extLst>
-              <c:ext xmlns:c15="http://schemas.microsoft.com/office/drawing/2012/chart" uri="{CE6537A1-D6FC-4f65-9D91-7224C49458BB}">
-                <c15:showLeaderLines val="0"/>
-              </c:ext>
-            </c:extLst>
-          </c:dLbls>
           <c:cat>
             <c:strRef>
-              <c:f>Sheet1!$A$2:$A$5</c:f>
+              <c:f>Tabelle1!$A$2:$A$5</c:f>
               <c:strCache>
                 <c:ptCount val="4"/>
                 <c:pt idx="0">
-                  <c:v>value 1</c:v>
+                  <c:v>cat1</c:v>
                 </c:pt>
                 <c:pt idx="1">
-                  <c:v>value 2</c:v>
+                  <c:v>cat2</c:v>
                 </c:pt>
                 <c:pt idx="2">
-                  <c:v>value 3</c:v>
+                  <c:v>cat3</c:v>
                 </c:pt>
                 <c:pt idx="3">
-                  <c:v>value 4</c:v>
+                  <c:v>cat4</c:v>
                 </c:pt>
               </c:strCache>
             </c:strRef>
           </c:cat>
           <c:val>
             <c:numRef>
-              <c:f>Sheet1!$B$2:$B$5</c:f>
+              <c:f>Tabelle1!$B$2:$B$5</c:f>
               <c:numCache>
                 <c:formatCode>General</c:formatCode>
                 <c:ptCount val="4"/>
@@ -241,7 +243,7 @@
           </c:val>
           <c:extLst>
             <c:ext xmlns:c16="http://schemas.microsoft.com/office/drawing/2014/chart" uri="{C3380CC4-5D6E-409C-BE32-E72D297353CC}">
-              <c16:uniqueId val="{00000000-972A-488E-AD9B-0E7E0527AC36}"/>
+              <c16:uniqueId val="{00000000-AAA7-46A1-9CA3-1B4B3E46585C}"/>
             </c:ext>
           </c:extLst>
         </c:ser>
@@ -250,85 +252,48 @@
           <c:order val="1"/>
           <c:tx>
             <c:strRef>
-              <c:f>Sheet1!$C$1</c:f>
+              <c:f>Tabelle1!$C$1</c:f>
               <c:strCache>
                 <c:ptCount val="1"/>
                 <c:pt idx="0">
-                  <c:v>value 2</c:v>
+                  <c:v>row2</c:v>
                 </c:pt>
               </c:strCache>
             </c:strRef>
           </c:tx>
           <c:spPr>
             <a:solidFill>
-              <a:schemeClr val="bg1">
-                <a:lumMod val="95000"/>
-                <a:alpha val="60000"/>
-              </a:schemeClr>
+              <a:schemeClr val="accent2"/>
             </a:solidFill>
+            <a:ln>
+              <a:noFill/>
+            </a:ln>
+            <a:effectLst/>
           </c:spPr>
           <c:invertIfNegative val="0"/>
-          <c:dLbls>
-            <c:spPr>
-              <a:noFill/>
-              <a:ln>
-                <a:noFill/>
-              </a:ln>
-              <a:effectLst/>
-            </c:spPr>
-            <c:txPr>
-              <a:bodyPr/>
-              <a:lstStyle/>
-              <a:p>
-                <a:pPr>
-                  <a:defRPr sz="1200" b="1">
-                    <a:solidFill>
-                      <a:schemeClr val="bg1"/>
-                    </a:solidFill>
-                    <a:latin typeface="Tahoma" panose="020B0604030504040204" pitchFamily="34" charset="0"/>
-                    <a:ea typeface="Tahoma" panose="020B0604030504040204" pitchFamily="34" charset="0"/>
-                    <a:cs typeface="Tahoma" panose="020B0604030504040204" pitchFamily="34" charset="0"/>
-                  </a:defRPr>
-                </a:pPr>
-                <a:endParaRPr lang="zh-CN"/>
-              </a:p>
-            </c:txPr>
-            <c:showLegendKey val="0"/>
-            <c:showVal val="1"/>
-            <c:showCatName val="0"/>
-            <c:showSerName val="0"/>
-            <c:showPercent val="0"/>
-            <c:showBubbleSize val="0"/>
-            <c:showLeaderLines val="0"/>
-            <c:extLst>
-              <c:ext xmlns:c15="http://schemas.microsoft.com/office/drawing/2012/chart" uri="{CE6537A1-D6FC-4f65-9D91-7224C49458BB}">
-                <c15:showLeaderLines val="0"/>
-              </c:ext>
-            </c:extLst>
-          </c:dLbls>
           <c:cat>
             <c:strRef>
-              <c:f>Sheet1!$A$2:$A$5</c:f>
+              <c:f>Tabelle1!$A$2:$A$5</c:f>
               <c:strCache>
                 <c:ptCount val="4"/>
                 <c:pt idx="0">
-                  <c:v>value 1</c:v>
+                  <c:v>cat1</c:v>
                 </c:pt>
                 <c:pt idx="1">
-                  <c:v>value 2</c:v>
+                  <c:v>cat2</c:v>
                 </c:pt>
                 <c:pt idx="2">
-                  <c:v>value 3</c:v>
+                  <c:v>cat3</c:v>
                 </c:pt>
                 <c:pt idx="3">
-                  <c:v>value 4</c:v>
+                  <c:v>cat4</c:v>
                 </c:pt>
               </c:strCache>
             </c:strRef>
           </c:cat>
           <c:val>
             <c:numRef>
-              <c:f>Sheet1!$C$2:$C$5</c:f>
+              <c:f>Tabelle1!$C$2:$C$5</c:f>
               <c:numCache>
                 <c:formatCode>General</c:formatCode>
                 <c:ptCount val="4"/>
@@ -349,7 +314,7 @@
           </c:val>
           <c:extLst>
             <c:ext xmlns:c16="http://schemas.microsoft.com/office/drawing/2014/chart" uri="{C3380CC4-5D6E-409C-BE32-E72D297353CC}">
-              <c16:uniqueId val="{00000001-972A-488E-AD9B-0E7E0527AC36}"/>
+              <c16:uniqueId val="{00000001-AAA7-46A1-9CA3-1B4B3E46585C}"/>
             </c:ext>
           </c:extLst>
         </c:ser>
@@ -358,84 +323,48 @@
           <c:order val="2"/>
           <c:tx>
             <c:strRef>
-              <c:f>Sheet1!$D$1</c:f>
+              <c:f>Tabelle1!$D$1</c:f>
               <c:strCache>
                 <c:ptCount val="1"/>
                 <c:pt idx="0">
-                  <c:v>value 3</c:v>
+                  <c:v>row3</c:v>
                 </c:pt>
               </c:strCache>
             </c:strRef>
           </c:tx>
           <c:spPr>
             <a:solidFill>
-              <a:srgbClr val="254EFB">
-                <a:alpha val="60000"/>
-              </a:srgbClr>
+              <a:schemeClr val="accent3"/>
             </a:solidFill>
+            <a:ln>
+              <a:noFill/>
+            </a:ln>
+            <a:effectLst/>
           </c:spPr>
           <c:invertIfNegative val="0"/>
-          <c:dLbls>
-            <c:spPr>
-              <a:noFill/>
-              <a:ln>
-                <a:noFill/>
-              </a:ln>
-              <a:effectLst/>
-            </c:spPr>
-            <c:txPr>
-              <a:bodyPr/>
-              <a:lstStyle/>
-              <a:p>
-                <a:pPr>
-                  <a:defRPr sz="1200" b="1">
-                    <a:solidFill>
-                      <a:srgbClr val="254EFB"/>
-                    </a:solidFill>
-                    <a:latin typeface="Tahoma" panose="020B0604030504040204" pitchFamily="34" charset="0"/>
-                    <a:ea typeface="Tahoma" panose="020B0604030504040204" pitchFamily="34" charset="0"/>
-                    <a:cs typeface="Tahoma" panose="020B0604030504040204" pitchFamily="34" charset="0"/>
-                  </a:defRPr>
-                </a:pPr>
-                <a:endParaRPr lang="zh-CN"/>
-              </a:p>
-            </c:txPr>
-            <c:showLegendKey val="0"/>
-            <c:showVal val="1"/>
-            <c:showCatName val="0"/>
-            <c:showSerName val="0"/>
-            <c:showPercent val="0"/>
-            <c:showBubbleSize val="0"/>
-            <c:showLeaderLines val="0"/>
-            <c:extLst>
-              <c:ext xmlns:c15="http://schemas.microsoft.com/office/drawing/2012/chart" uri="{CE6537A1-D6FC-4f65-9D91-7224C49458BB}">
-                <c15:showLeaderLines val="0"/>
-              </c:ext>
-            </c:extLst>
-          </c:dLbls>
           <c:cat>
             <c:strRef>
-              <c:f>Sheet1!$A$2:$A$5</c:f>
+              <c:f>Tabelle1!$A$2:$A$5</c:f>
               <c:strCache>
                 <c:ptCount val="4"/>
                 <c:pt idx="0">
-                  <c:v>value 1</c:v>
+                  <c:v>cat1</c:v>
                 </c:pt>
                 <c:pt idx="1">
-                  <c:v>value 2</c:v>
+                  <c:v>cat2</c:v>
                 </c:pt>
                 <c:pt idx="2">
-                  <c:v>value 3</c:v>
+                  <c:v>cat3</c:v>
                 </c:pt>
                 <c:pt idx="3">
-                  <c:v>value 4</c:v>
+                  <c:v>cat4</c:v>
                 </c:pt>
               </c:strCache>
             </c:strRef>
           </c:cat>
           <c:val>
             <c:numRef>
-              <c:f>Sheet1!$D$2:$D$5</c:f>
+              <c:f>Tabelle1!$D$2:$D$5</c:f>
               <c:numCache>
                 <c:formatCode>General</c:formatCode>
                 <c:ptCount val="4"/>
@@ -456,7 +385,7 @@
           </c:val>
           <c:extLst>
             <c:ext xmlns:c16="http://schemas.microsoft.com/office/drawing/2014/chart" uri="{C3380CC4-5D6E-409C-BE32-E72D297353CC}">
-              <c16:uniqueId val="{00000002-972A-488E-AD9B-0E7E0527AC36}"/>
+              <c16:uniqueId val="{00000002-AAA7-46A1-9CA3-1B4B3E46585C}"/>
             </c:ext>
           </c:extLst>
         </c:ser>
@@ -468,50 +397,56 @@
           <c:showPercent val="0"/>
           <c:showBubbleSize val="0"/>
         </c:dLbls>
-        <c:gapWidth val="146"/>
-        <c:axId val="211315712"/>
-        <c:axId val="211321600"/>
+        <c:gapWidth val="219"/>
+        <c:overlap val="-27"/>
+        <c:axId val="1478167632"/>
+        <c:axId val="1478172432"/>
       </c:barChart>
       <c:catAx>
-        <c:axId val="211315712"/>
+        <c:axId val="1478167632"/>
         <c:scaling>
           <c:orientation val="minMax"/>
         </c:scaling>
         <c:delete val="0"/>
         <c:axPos val="b"/>
-        <c:numFmt formatCode="General" sourceLinked="0"/>
-        <c:majorTickMark val="in"/>
+        <c:numFmt formatCode="General" sourceLinked="1"/>
+        <c:majorTickMark val="none"/>
         <c:minorTickMark val="none"/>
         <c:tickLblPos val="nextTo"/>
         <c:spPr>
-          <a:ln>
+          <a:noFill/>
+          <a:ln w="9525" cap="flat" cmpd="sng" algn="ctr">
             <a:solidFill>
-              <a:schemeClr val="bg1">
-                <a:lumMod val="75000"/>
+              <a:schemeClr val="tx1">
+                <a:lumMod val="15000"/>
+                <a:lumOff val="85000"/>
               </a:schemeClr>
             </a:solidFill>
+            <a:round/>
           </a:ln>
+          <a:effectLst/>
         </c:spPr>
         <c:txPr>
-          <a:bodyPr/>
+          <a:bodyPr rot="-60000000" spcFirstLastPara="1" vertOverflow="ellipsis" vert="horz" wrap="square" anchor="ctr" anchorCtr="1"/>
           <a:lstStyle/>
           <a:p>
             <a:pPr>
-              <a:defRPr sz="1050" b="1">
+              <a:defRPr sz="1197" b="0" i="0" u="none" strike="noStrike" kern="1200" baseline="0">
                 <a:solidFill>
-                  <a:schemeClr val="bg1">
-                    <a:lumMod val="75000"/>
+                  <a:schemeClr val="tx1">
+                    <a:lumMod val="65000"/>
+                    <a:lumOff val="35000"/>
                   </a:schemeClr>
                 </a:solidFill>
-                <a:latin typeface="Tahoma" panose="020B0604030504040204" pitchFamily="34" charset="0"/>
-                <a:ea typeface="Tahoma" panose="020B0604030504040204" pitchFamily="34" charset="0"/>
-                <a:cs typeface="Tahoma" panose="020B0604030504040204" pitchFamily="34" charset="0"/>
+                <a:latin typeface="+mn-lt"/>
+                <a:ea typeface="+mn-ea"/>
+                <a:cs typeface="+mn-cs"/>
               </a:defRPr>
             </a:pPr>
-            <a:endParaRPr lang="zh-CN"/>
+            <a:endParaRPr lang="en-US"/>
           </a:p>
         </c:txPr>
-        <c:crossAx val="211321600"/>
+        <c:crossAx val="1478172432"/>
         <c:crosses val="autoZero"/>
         <c:auto val="1"/>
         <c:lblAlgn val="ctr"/>
@@ -519,7 +454,7 @@
         <c:noMultiLvlLbl val="0"/>
       </c:catAx>
       <c:valAx>
-        <c:axId val="211321600"/>
+        <c:axId val="1478172432"/>
         <c:scaling>
           <c:orientation val="minMax"/>
         </c:scaling>
@@ -527,79 +462,94 @@
         <c:axPos val="l"/>
         <c:majorGridlines>
           <c:spPr>
-            <a:ln w="3175">
+            <a:ln w="9525" cap="flat" cmpd="sng" algn="ctr">
+              <a:solidFill>
+                <a:schemeClr val="tx1">
+                  <a:lumMod val="15000"/>
+                  <a:lumOff val="85000"/>
+                </a:schemeClr>
+              </a:solidFill>
+              <a:round/>
+            </a:ln>
+            <a:effectLst/>
+          </c:spPr>
+        </c:majorGridlines>
+        <c:numFmt formatCode="General" sourceLinked="1"/>
+        <c:majorTickMark val="none"/>
+        <c:minorTickMark val="none"/>
+        <c:tickLblPos val="nextTo"/>
+        <c:spPr>
+          <a:noFill/>
+          <a:ln>
+            <a:noFill/>
+          </a:ln>
+          <a:effectLst/>
+        </c:spPr>
+        <c:txPr>
+          <a:bodyPr rot="-60000000" spcFirstLastPara="1" vertOverflow="ellipsis" vert="horz" wrap="square" anchor="ctr" anchorCtr="1"/>
+          <a:lstStyle/>
+          <a:p>
+            <a:pPr>
+              <a:defRPr sz="1197" b="0" i="0" u="none" strike="noStrike" kern="1200" baseline="0">
+                <a:solidFill>
+                  <a:schemeClr val="tx1">
+                    <a:lumMod val="65000"/>
+                    <a:lumOff val="35000"/>
+                  </a:schemeClr>
+                </a:solidFill>
+                <a:latin typeface="+mn-lt"/>
+                <a:ea typeface="+mn-ea"/>
+                <a:cs typeface="+mn-cs"/>
+              </a:defRPr>
+            </a:pPr>
+            <a:endParaRPr lang="en-US"/>
+          </a:p>
+        </c:txPr>
+        <c:crossAx val="1478167632"/>
+        <c:crosses val="autoZero"/>
+        <c:crossBetween val="between"/>
+      </c:valAx>
+    </c:plotArea>
+    <c:legend>
+      <c:legendPos val="b"/>
+      <c:overlay val="0"/>
+      <c:spPr>
+        <a:noFill/>
+        <a:ln>
+          <a:noFill/>
+        </a:ln>
+        <a:effectLst/>
+      </c:spPr>
+      <c:txPr>
+        <a:bodyPr rot="0" spcFirstLastPara="1" vertOverflow="ellipsis" vert="horz" wrap="square" anchor="ctr" anchorCtr="1"/>
+        <a:lstStyle/>
+        <a:p>
+          <a:pPr>
+            <a:defRPr sz="1197" b="0" i="0" u="none" strike="noStrike" kern="1200" baseline="0">
               <a:solidFill>
                 <a:schemeClr val="tx1">
                   <a:lumMod val="65000"/>
                   <a:lumOff val="35000"/>
                 </a:schemeClr>
               </a:solidFill>
-              <a:prstDash val="dash"/>
-            </a:ln>
-          </c:spPr>
-        </c:majorGridlines>
-        <c:numFmt formatCode="General" sourceLinked="1"/>
-        <c:majorTickMark val="in"/>
-        <c:minorTickMark val="none"/>
-        <c:tickLblPos val="nextTo"/>
-        <c:txPr>
-          <a:bodyPr/>
-          <a:lstStyle/>
-          <a:p>
-            <a:pPr>
-              <a:defRPr sz="1100">
-                <a:solidFill>
-                  <a:schemeClr val="bg1">
-                    <a:lumMod val="75000"/>
-                  </a:schemeClr>
-                </a:solidFill>
-              </a:defRPr>
-            </a:pPr>
-            <a:endParaRPr lang="zh-CN"/>
-          </a:p>
-        </c:txPr>
-        <c:crossAx val="211315712"/>
-        <c:crosses val="autoZero"/>
-        <c:crossBetween val="between"/>
-      </c:valAx>
-      <c:spPr>
-        <a:ln>
-          <a:noFill/>
-        </a:ln>
-      </c:spPr>
-    </c:plotArea>
-    <c:legend>
-      <c:legendPos val="tr"/>
-      <c:layout>
-        <c:manualLayout>
-          <c:xMode val="edge"/>
-          <c:yMode val="edge"/>
-          <c:x val="0.69453261419567258"/>
-          <c:y val="2.7206007314917031E-2"/>
-          <c:w val="0.30164793853893257"/>
-          <c:h val="8.2552485888866142E-2"/>
-        </c:manualLayout>
-      </c:layout>
-      <c:overlay val="0"/>
-      <c:txPr>
-        <a:bodyPr/>
-        <a:lstStyle/>
-        <a:p>
-          <a:pPr>
-            <a:defRPr sz="900">
-              <a:solidFill>
-                <a:schemeClr val="bg1">
-                  <a:lumMod val="75000"/>
-                </a:schemeClr>
-              </a:solidFill>
+              <a:latin typeface="+mn-lt"/>
+              <a:ea typeface="+mn-ea"/>
+              <a:cs typeface="+mn-cs"/>
             </a:defRPr>
           </a:pPr>
-          <a:endParaRPr lang="zh-CN"/>
+          <a:endParaRPr lang="en-US"/>
         </a:p>
       </c:txPr>
     </c:legend>
     <c:plotVisOnly val="1"/>
     <c:dispBlanksAs val="gap"/>
+    <c:extLst>
+      <c:ext xmlns:c16r3="http://schemas.microsoft.com/office/drawing/2017/03/chart" uri="{56B9EC1D-385E-4148-901F-78D8002777C0}">
+        <c16r3:dataDisplayOptions16>
+          <c16r3:dispNaAsBlank val="1"/>
+        </c16r3:dataDisplayOptions16>
+      </c:ext>
+    </c:extLst>
     <c:showDLblsOverMax val="0"/>
   </c:chart>
   <c:txPr>
@@ -607,20 +557,563 @@
     <a:lstStyle/>
     <a:p>
       <a:pPr>
-        <a:defRPr sz="1800"/>
+        <a:defRPr/>
       </a:pPr>
-      <a:endParaRPr lang="zh-CN"/>
+      <a:endParaRPr lang="en-US"/>
     </a:p>
   </c:txPr>
-  <c:externalData r:id="rId1">
+  <c:externalData r:id="rId3">
     <c:autoUpdate val="0"/>
   </c:externalData>
 </c:chartSpace>
 </file>
 
+<file path=ppt/charts/colors1.xml><?xml version="1.0" encoding="utf-8"?>
+<cs:colorStyle xmlns:cs="http://schemas.microsoft.com/office/drawing/2012/chartStyle" xmlns:a="http://schemas.openxmlformats.org/drawingml/2006/main" meth="cycle" id="10">
+  <a:schemeClr val="accent1"/>
+  <a:schemeClr val="accent2"/>
+  <a:schemeClr val="accent3"/>
+  <a:schemeClr val="accent4"/>
+  <a:schemeClr val="accent5"/>
+  <a:schemeClr val="accent6"/>
+  <cs:variation/>
+  <cs:variation>
+    <a:lumMod val="60000"/>
+  </cs:variation>
+  <cs:variation>
+    <a:lumMod val="80000"/>
+    <a:lumOff val="20000"/>
+  </cs:variation>
+  <cs:variation>
+    <a:lumMod val="80000"/>
+  </cs:variation>
+  <cs:variation>
+    <a:lumMod val="60000"/>
+    <a:lumOff val="40000"/>
+  </cs:variation>
+  <cs:variation>
+    <a:lumMod val="50000"/>
+  </cs:variation>
+  <cs:variation>
+    <a:lumMod val="70000"/>
+    <a:lumOff val="30000"/>
+  </cs:variation>
+  <cs:variation>
+    <a:lumMod val="70000"/>
+  </cs:variation>
+  <cs:variation>
+    <a:lumMod val="50000"/>
+    <a:lumOff val="50000"/>
+  </cs:variation>
+</cs:colorStyle>
+</file>
+
+<file path=ppt/charts/style1.xml><?xml version="1.0" encoding="utf-8"?>
+<cs:chartStyle xmlns:cs="http://schemas.microsoft.com/office/drawing/2012/chartStyle" xmlns:a="http://schemas.openxmlformats.org/drawingml/2006/main" id="201">
+  <cs:axisTitle>
+    <cs:lnRef idx="0"/>
+    <cs:fillRef idx="0"/>
+    <cs:effectRef idx="0"/>
+    <cs:fontRef idx="minor">
+      <a:schemeClr val="tx1">
+        <a:lumMod val="65000"/>
+        <a:lumOff val="35000"/>
+      </a:schemeClr>
+    </cs:fontRef>
+    <cs:defRPr sz="1330" kern="1200"/>
+  </cs:axisTitle>
+  <cs:categoryAxis>
+    <cs:lnRef idx="0"/>
+    <cs:fillRef idx="0"/>
+    <cs:effectRef idx="0"/>
+    <cs:fontRef idx="minor">
+      <a:schemeClr val="tx1">
+        <a:lumMod val="65000"/>
+        <a:lumOff val="35000"/>
+      </a:schemeClr>
+    </cs:fontRef>
+    <cs:spPr>
+      <a:ln w="9525" cap="flat" cmpd="sng" algn="ctr">
+        <a:solidFill>
+          <a:schemeClr val="tx1">
+            <a:lumMod val="15000"/>
+            <a:lumOff val="85000"/>
+          </a:schemeClr>
+        </a:solidFill>
+        <a:round/>
+      </a:ln>
+    </cs:spPr>
+    <cs:defRPr sz="1197" kern="1200"/>
+  </cs:categoryAxis>
+  <cs:chartArea mods="allowNoFillOverride allowNoLineOverride">
+    <cs:lnRef idx="0"/>
+    <cs:fillRef idx="0"/>
+    <cs:effectRef idx="0"/>
+    <cs:fontRef idx="minor">
+      <a:schemeClr val="tx1"/>
+    </cs:fontRef>
+    <cs:spPr>
+      <a:solidFill>
+        <a:schemeClr val="bg1"/>
+      </a:solidFill>
+      <a:ln w="9525" cap="flat" cmpd="sng" algn="ctr">
+        <a:solidFill>
+          <a:schemeClr val="tx1">
+            <a:lumMod val="15000"/>
+            <a:lumOff val="85000"/>
+          </a:schemeClr>
+        </a:solidFill>
+        <a:round/>
+      </a:ln>
+    </cs:spPr>
+    <cs:defRPr sz="1330" kern="1200"/>
+  </cs:chartArea>
+  <cs:dataLabel>
+    <cs:lnRef idx="0"/>
+    <cs:fillRef idx="0"/>
+    <cs:effectRef idx="0"/>
+    <cs:fontRef idx="minor">
+      <a:schemeClr val="tx1">
+        <a:lumMod val="75000"/>
+        <a:lumOff val="25000"/>
+      </a:schemeClr>
+    </cs:fontRef>
+    <cs:defRPr sz="1197" kern="1200"/>
+  </cs:dataLabel>
+  <cs:dataLabelCallout>
+    <cs:lnRef idx="0"/>
+    <cs:fillRef idx="0"/>
+    <cs:effectRef idx="0"/>
+    <cs:fontRef idx="minor">
+      <a:schemeClr val="dk1">
+        <a:lumMod val="65000"/>
+        <a:lumOff val="35000"/>
+      </a:schemeClr>
+    </cs:fontRef>
+    <cs:spPr>
+      <a:solidFill>
+        <a:schemeClr val="lt1"/>
+      </a:solidFill>
+      <a:ln>
+        <a:solidFill>
+          <a:schemeClr val="dk1">
+            <a:lumMod val="25000"/>
+            <a:lumOff val="75000"/>
+          </a:schemeClr>
+        </a:solidFill>
+      </a:ln>
+    </cs:spPr>
+    <cs:defRPr sz="1197" kern="1200"/>
+    <cs:bodyPr rot="0" spcFirstLastPara="1" vertOverflow="clip" horzOverflow="clip" vert="horz" wrap="square" lIns="36576" tIns="18288" rIns="36576" bIns="18288" anchor="ctr" anchorCtr="1">
+      <a:spAutoFit/>
+    </cs:bodyPr>
+  </cs:dataLabelCallout>
+  <cs:dataPoint>
+    <cs:lnRef idx="0"/>
+    <cs:fillRef idx="1">
+      <cs:styleClr val="auto"/>
+    </cs:fillRef>
+    <cs:effectRef idx="0"/>
+    <cs:fontRef idx="minor">
+      <a:schemeClr val="tx1"/>
+    </cs:fontRef>
+  </cs:dataPoint>
+  <cs:dataPoint3D>
+    <cs:lnRef idx="0"/>
+    <cs:fillRef idx="1">
+      <cs:styleClr val="auto"/>
+    </cs:fillRef>
+    <cs:effectRef idx="0"/>
+    <cs:fontRef idx="minor">
+      <a:schemeClr val="tx1"/>
+    </cs:fontRef>
+  </cs:dataPoint3D>
+  <cs:dataPointLine>
+    <cs:lnRef idx="0">
+      <cs:styleClr val="auto"/>
+    </cs:lnRef>
+    <cs:fillRef idx="1"/>
+    <cs:effectRef idx="0"/>
+    <cs:fontRef idx="minor">
+      <a:schemeClr val="tx1"/>
+    </cs:fontRef>
+    <cs:spPr>
+      <a:ln w="28575" cap="rnd">
+        <a:solidFill>
+          <a:schemeClr val="phClr"/>
+        </a:solidFill>
+        <a:round/>
+      </a:ln>
+    </cs:spPr>
+  </cs:dataPointLine>
+  <cs:dataPointMarker>
+    <cs:lnRef idx="0">
+      <cs:styleClr val="auto"/>
+    </cs:lnRef>
+    <cs:fillRef idx="1">
+      <cs:styleClr val="auto"/>
+    </cs:fillRef>
+    <cs:effectRef idx="0"/>
+    <cs:fontRef idx="minor">
+      <a:schemeClr val="tx1"/>
+    </cs:fontRef>
+    <cs:spPr>
+      <a:ln w="9525">
+        <a:solidFill>
+          <a:schemeClr val="phClr"/>
+        </a:solidFill>
+      </a:ln>
+    </cs:spPr>
+  </cs:dataPointMarker>
+  <cs:dataPointMarkerLayout symbol="circle" size="5"/>
+  <cs:dataPointWireframe>
+    <cs:lnRef idx="0">
+      <cs:styleClr val="auto"/>
+    </cs:lnRef>
+    <cs:fillRef idx="1"/>
+    <cs:effectRef idx="0"/>
+    <cs:fontRef idx="minor">
+      <a:schemeClr val="tx1"/>
+    </cs:fontRef>
+    <cs:spPr>
+      <a:ln w="9525" cap="rnd">
+        <a:solidFill>
+          <a:schemeClr val="phClr"/>
+        </a:solidFill>
+        <a:round/>
+      </a:ln>
+    </cs:spPr>
+  </cs:dataPointWireframe>
+  <cs:dataTable>
+    <cs:lnRef idx="0"/>
+    <cs:fillRef idx="0"/>
+    <cs:effectRef idx="0"/>
+    <cs:fontRef idx="minor">
+      <a:schemeClr val="tx1">
+        <a:lumMod val="65000"/>
+        <a:lumOff val="35000"/>
+      </a:schemeClr>
+    </cs:fontRef>
+    <cs:spPr>
+      <a:noFill/>
+      <a:ln w="9525" cap="flat" cmpd="sng" algn="ctr">
+        <a:solidFill>
+          <a:schemeClr val="tx1">
+            <a:lumMod val="15000"/>
+            <a:lumOff val="85000"/>
+          </a:schemeClr>
+        </a:solidFill>
+        <a:round/>
+      </a:ln>
+    </cs:spPr>
+    <cs:defRPr sz="1197" kern="1200"/>
+  </cs:dataTable>
+  <cs:downBar>
+    <cs:lnRef idx="0"/>
+    <cs:fillRef idx="0"/>
+    <cs:effectRef idx="0"/>
+    <cs:fontRef idx="minor">
+      <a:schemeClr val="dk1"/>
+    </cs:fontRef>
+    <cs:spPr>
+      <a:solidFill>
+        <a:schemeClr val="dk1">
+          <a:lumMod val="65000"/>
+          <a:lumOff val="35000"/>
+        </a:schemeClr>
+      </a:solidFill>
+      <a:ln w="9525">
+        <a:solidFill>
+          <a:schemeClr val="tx1">
+            <a:lumMod val="65000"/>
+            <a:lumOff val="35000"/>
+          </a:schemeClr>
+        </a:solidFill>
+      </a:ln>
+    </cs:spPr>
+  </cs:downBar>
+  <cs:dropLine>
+    <cs:lnRef idx="0"/>
+    <cs:fillRef idx="0"/>
+    <cs:effectRef idx="0"/>
+    <cs:fontRef idx="minor">
+      <a:schemeClr val="tx1"/>
+    </cs:fontRef>
+    <cs:spPr>
+      <a:ln w="9525" cap="flat" cmpd="sng" algn="ctr">
+        <a:solidFill>
+          <a:schemeClr val="tx1">
+            <a:lumMod val="35000"/>
+            <a:lumOff val="65000"/>
+          </a:schemeClr>
+        </a:solidFill>
+        <a:round/>
+      </a:ln>
+    </cs:spPr>
+  </cs:dropLine>
+  <cs:errorBar>
+    <cs:lnRef idx="0"/>
+    <cs:fillRef idx="0"/>
+    <cs:effectRef idx="0"/>
+    <cs:fontRef idx="minor">
+      <a:schemeClr val="tx1"/>
+    </cs:fontRef>
+    <cs:spPr>
+      <a:ln w="9525" cap="flat" cmpd="sng" algn="ctr">
+        <a:solidFill>
+          <a:schemeClr val="tx1">
+            <a:lumMod val="65000"/>
+            <a:lumOff val="35000"/>
+          </a:schemeClr>
+        </a:solidFill>
+        <a:round/>
+      </a:ln>
+    </cs:spPr>
+  </cs:errorBar>
+  <cs:floor>
+    <cs:lnRef idx="0"/>
+    <cs:fillRef idx="0"/>
+    <cs:effectRef idx="0"/>
+    <cs:fontRef idx="minor">
+      <a:schemeClr val="tx1"/>
+    </cs:fontRef>
+    <cs:spPr>
+      <a:noFill/>
+      <a:ln>
+        <a:noFill/>
+      </a:ln>
+    </cs:spPr>
+  </cs:floor>
+  <cs:gridlineMajor>
+    <cs:lnRef idx="0"/>
+    <cs:fillRef idx="0"/>
+    <cs:effectRef idx="0"/>
+    <cs:fontRef idx="minor">
+      <a:schemeClr val="tx1"/>
+    </cs:fontRef>
+    <cs:spPr>
+      <a:ln w="9525" cap="flat" cmpd="sng" algn="ctr">
+        <a:solidFill>
+          <a:schemeClr val="tx1">
+            <a:lumMod val="15000"/>
+            <a:lumOff val="85000"/>
+          </a:schemeClr>
+        </a:solidFill>
+        <a:round/>
+      </a:ln>
+    </cs:spPr>
+  </cs:gridlineMajor>
+  <cs:gridlineMinor>
+    <cs:lnRef idx="0"/>
+    <cs:fillRef idx="0"/>
+    <cs:effectRef idx="0"/>
+    <cs:fontRef idx="minor">
+      <a:schemeClr val="tx1"/>
+    </cs:fontRef>
+    <cs:spPr>
+      <a:ln w="9525" cap="flat" cmpd="sng" algn="ctr">
+        <a:solidFill>
+          <a:schemeClr val="tx1">
+            <a:lumMod val="5000"/>
+            <a:lumOff val="95000"/>
+          </a:schemeClr>
+        </a:solidFill>
+        <a:round/>
+      </a:ln>
+    </cs:spPr>
+  </cs:gridlineMinor>
+  <cs:hiLoLine>
+    <cs:lnRef idx="0"/>
+    <cs:fillRef idx="0"/>
+    <cs:effectRef idx="0"/>
+    <cs:fontRef idx="minor">
+      <a:schemeClr val="tx1"/>
+    </cs:fontRef>
+    <cs:spPr>
+      <a:ln w="9525" cap="flat" cmpd="sng" algn="ctr">
+        <a:solidFill>
+          <a:schemeClr val="tx1">
+            <a:lumMod val="75000"/>
+            <a:lumOff val="25000"/>
+          </a:schemeClr>
+        </a:solidFill>
+        <a:round/>
+      </a:ln>
+    </cs:spPr>
+  </cs:hiLoLine>
+  <cs:leaderLine>
+    <cs:lnRef idx="0"/>
+    <cs:fillRef idx="0"/>
+    <cs:effectRef idx="0"/>
+    <cs:fontRef idx="minor">
+      <a:schemeClr val="tx1"/>
+    </cs:fontRef>
+    <cs:spPr>
+      <a:ln w="9525" cap="flat" cmpd="sng" algn="ctr">
+        <a:solidFill>
+          <a:schemeClr val="tx1">
+            <a:lumMod val="35000"/>
+            <a:lumOff val="65000"/>
+          </a:schemeClr>
+        </a:solidFill>
+        <a:round/>
+      </a:ln>
+    </cs:spPr>
+  </cs:leaderLine>
+  <cs:legend>
+    <cs:lnRef idx="0"/>
+    <cs:fillRef idx="0"/>
+    <cs:effectRef idx="0"/>
+    <cs:fontRef idx="minor">
+      <a:schemeClr val="tx1">
+        <a:lumMod val="65000"/>
+        <a:lumOff val="35000"/>
+      </a:schemeClr>
+    </cs:fontRef>
+    <cs:defRPr sz="1197" kern="1200"/>
+  </cs:legend>
+  <cs:plotArea mods="allowNoFillOverride allowNoLineOverride">
+    <cs:lnRef idx="0"/>
+    <cs:fillRef idx="0"/>
+    <cs:effectRef idx="0"/>
+    <cs:fontRef idx="minor">
+      <a:schemeClr val="tx1"/>
+    </cs:fontRef>
+  </cs:plotArea>
+  <cs:plotArea3D mods="allowNoFillOverride allowNoLineOverride">
+    <cs:lnRef idx="0"/>
+    <cs:fillRef idx="0"/>
+    <cs:effectRef idx="0"/>
+    <cs:fontRef idx="minor">
+      <a:schemeClr val="tx1"/>
+    </cs:fontRef>
+  </cs:plotArea3D>
+  <cs:seriesAxis>
+    <cs:lnRef idx="0"/>
+    <cs:fillRef idx="0"/>
+    <cs:effectRef idx="0"/>
+    <cs:fontRef idx="minor">
+      <a:schemeClr val="tx1">
+        <a:lumMod val="65000"/>
+        <a:lumOff val="35000"/>
+      </a:schemeClr>
+    </cs:fontRef>
+    <cs:defRPr sz="1197" kern="1200"/>
+  </cs:seriesAxis>
+  <cs:seriesLine>
+    <cs:lnRef idx="0"/>
+    <cs:fillRef idx="0"/>
+    <cs:effectRef idx="0"/>
+    <cs:fontRef idx="minor">
+      <a:schemeClr val="tx1"/>
+    </cs:fontRef>
+    <cs:spPr>
+      <a:ln w="9525" cap="flat" cmpd="sng" algn="ctr">
+        <a:solidFill>
+          <a:schemeClr val="tx1">
+            <a:lumMod val="35000"/>
+            <a:lumOff val="65000"/>
+          </a:schemeClr>
+        </a:solidFill>
+        <a:round/>
+      </a:ln>
+    </cs:spPr>
+  </cs:seriesLine>
+  <cs:title>
+    <cs:lnRef idx="0"/>
+    <cs:fillRef idx="0"/>
+    <cs:effectRef idx="0"/>
+    <cs:fontRef idx="minor">
+      <a:schemeClr val="tx1">
+        <a:lumMod val="65000"/>
+        <a:lumOff val="35000"/>
+      </a:schemeClr>
+    </cs:fontRef>
+    <cs:defRPr sz="1862" b="0" kern="1200" spc="0" baseline="0"/>
+  </cs:title>
+  <cs:trendline>
+    <cs:lnRef idx="0">
+      <cs:styleClr val="auto"/>
+    </cs:lnRef>
+    <cs:fillRef idx="0"/>
+    <cs:effectRef idx="0"/>
+    <cs:fontRef idx="minor">
+      <a:schemeClr val="tx1"/>
+    </cs:fontRef>
+    <cs:spPr>
+      <a:ln w="19050" cap="rnd">
+        <a:solidFill>
+          <a:schemeClr val="phClr"/>
+        </a:solidFill>
+        <a:prstDash val="sysDot"/>
+      </a:ln>
+    </cs:spPr>
+  </cs:trendline>
+  <cs:trendlineLabel>
+    <cs:lnRef idx="0"/>
+    <cs:fillRef idx="0"/>
+    <cs:effectRef idx="0"/>
+    <cs:fontRef idx="minor">
+      <a:schemeClr val="tx1">
+        <a:lumMod val="65000"/>
+        <a:lumOff val="35000"/>
+      </a:schemeClr>
+    </cs:fontRef>
+    <cs:defRPr sz="1197" kern="1200"/>
+  </cs:trendlineLabel>
+  <cs:upBar>
+    <cs:lnRef idx="0"/>
+    <cs:fillRef idx="0"/>
+    <cs:effectRef idx="0"/>
+    <cs:fontRef idx="minor">
+      <a:schemeClr val="dk1"/>
+    </cs:fontRef>
+    <cs:spPr>
+      <a:solidFill>
+        <a:schemeClr val="lt1"/>
+      </a:solidFill>
+      <a:ln w="9525">
+        <a:solidFill>
+          <a:schemeClr val="tx1">
+            <a:lumMod val="15000"/>
+            <a:lumOff val="85000"/>
+          </a:schemeClr>
+        </a:solidFill>
+      </a:ln>
+    </cs:spPr>
+  </cs:upBar>
+  <cs:valueAxis>
+    <cs:lnRef idx="0"/>
+    <cs:fillRef idx="0"/>
+    <cs:effectRef idx="0"/>
+    <cs:fontRef idx="minor">
+      <a:schemeClr val="tx1">
+        <a:lumMod val="65000"/>
+        <a:lumOff val="35000"/>
+      </a:schemeClr>
+    </cs:fontRef>
+    <cs:defRPr sz="1197" kern="1200"/>
+  </cs:valueAxis>
+  <cs:wall>
+    <cs:lnRef idx="0"/>
+    <cs:fillRef idx="0"/>
+    <cs:effectRef idx="0"/>
+    <cs:fontRef idx="minor">
+      <a:schemeClr val="tx1"/>
+    </cs:fontRef>
+    <cs:spPr>
+      <a:noFill/>
+      <a:ln>
+        <a:noFill/>
+      </a:ln>
+    </cs:spPr>
+  </cs:wall>
+</cs:chartStyle>
+</file>
+
 <file path=ppt/slideLayouts/slideLayout1.xml><?xml version="1.0" encoding="utf-8"?>
 <p:sldLayout xmlns:a="http://schemas.openxmlformats.org/drawingml/2006/main" xmlns:r="http://schemas.openxmlformats.org/officeDocument/2006/relationships" xmlns:p="http://schemas.openxmlformats.org/presentationml/2006/main" type="title" preserve="1">
-  <p:cSld name="Title Slide">
+  <p:cSld name="Titelfolie">
     <p:spTree>
       <p:nvGrpSpPr>
         <p:cNvPr id="1" name=""/>
@@ -637,10 +1130,10 @@
       </p:grpSpPr>
       <p:sp>
         <p:nvSpPr>
-          <p:cNvPr id="2" name="Title 1">
-            <a:extLst>
-              <a:ext uri="{FF2B5EF4-FFF2-40B4-BE49-F238E27FC236}">
-                <a16:creationId xmlns:a16="http://schemas.microsoft.com/office/drawing/2014/main" id="{F3A8654F-7898-45B0-AA4C-0F5A947711A6}"/>
+          <p:cNvPr id="2" name="Titel 1">
+            <a:extLst>
+              <a:ext uri="{FF2B5EF4-FFF2-40B4-BE49-F238E27FC236}">
+                <a16:creationId xmlns:a16="http://schemas.microsoft.com/office/drawing/2014/main" id="{911B6159-1FD9-BC1E-031D-3CC48C4712EB}"/>
               </a:ext>
             </a:extLst>
           </p:cNvPr>
@@ -666,19 +1159,19 @@
           </a:lstStyle>
           <a:p>
             <a:r>
-              <a:rPr lang="en-US" altLang="zh-CN"/>
-              <a:t>Click to edit Master title style</a:t>
-            </a:r>
-            <a:endParaRPr lang="zh-CN" altLang="en-US"/>
-          </a:p>
-        </p:txBody>
-      </p:sp>
-      <p:sp>
-        <p:nvSpPr>
-          <p:cNvPr id="3" name="Subtitle 2">
-            <a:extLst>
-              <a:ext uri="{FF2B5EF4-FFF2-40B4-BE49-F238E27FC236}">
-                <a16:creationId xmlns:a16="http://schemas.microsoft.com/office/drawing/2014/main" id="{A1EE31D5-91B5-40E5-9B9E-F43C7AA4C9A9}"/>
+              <a:rPr lang="de-DE"/>
+              <a:t>Mastertitelformat bearbeiten</a:t>
+            </a:r>
+            <a:endParaRPr lang="en-US"/>
+          </a:p>
+        </p:txBody>
+      </p:sp>
+      <p:sp>
+        <p:nvSpPr>
+          <p:cNvPr id="3" name="Untertitel 2">
+            <a:extLst>
+              <a:ext uri="{FF2B5EF4-FFF2-40B4-BE49-F238E27FC236}">
+                <a16:creationId xmlns:a16="http://schemas.microsoft.com/office/drawing/2014/main" id="{ED49DF0F-F208-D86D-EC2C-FD23F18EF8AE}"/>
               </a:ext>
             </a:extLst>
           </p:cNvPr>
@@ -737,19 +1230,19 @@
           </a:lstStyle>
           <a:p>
             <a:r>
-              <a:rPr lang="en-US" altLang="zh-CN"/>
-              <a:t>Click to edit Master subtitle style</a:t>
-            </a:r>
-            <a:endParaRPr lang="zh-CN" altLang="en-US"/>
-          </a:p>
-        </p:txBody>
-      </p:sp>
-      <p:sp>
-        <p:nvSpPr>
-          <p:cNvPr id="4" name="Date Placeholder 3">
-            <a:extLst>
-              <a:ext uri="{FF2B5EF4-FFF2-40B4-BE49-F238E27FC236}">
-                <a16:creationId xmlns:a16="http://schemas.microsoft.com/office/drawing/2014/main" id="{FED56216-8E09-4C2A-BAB7-514E058C7D01}"/>
+              <a:rPr lang="de-DE"/>
+              <a:t>Master-Untertitelformat bearbeiten</a:t>
+            </a:r>
+            <a:endParaRPr lang="en-US"/>
+          </a:p>
+        </p:txBody>
+      </p:sp>
+      <p:sp>
+        <p:nvSpPr>
+          <p:cNvPr id="4" name="Datumsplatzhalter 3">
+            <a:extLst>
+              <a:ext uri="{FF2B5EF4-FFF2-40B4-BE49-F238E27FC236}">
+                <a16:creationId xmlns:a16="http://schemas.microsoft.com/office/drawing/2014/main" id="{E60F1E29-1F4D-AC76-D836-5B54906DAD56}"/>
               </a:ext>
             </a:extLst>
           </p:cNvPr>
@@ -765,20 +1258,20 @@
           <a:bodyPr/>
           <a:lstStyle/>
           <a:p>
-            <a:fld id="{6F9AC78F-69F7-4DFA-9ED3-63209FEF1CF3}" type="datetimeFigureOut">
-              <a:rPr lang="zh-CN" altLang="en-US" smtClean="0"/>
-              <a:t>2020/6/22</a:t>
+            <a:fld id="{D3377326-B63D-4862-9B98-380EE10FA03E}" type="datetimeFigureOut">
+              <a:rPr lang="en-US" smtClean="0"/>
+              <a:t>7/12/2025</a:t>
             </a:fld>
-            <a:endParaRPr lang="zh-CN" altLang="en-US"/>
-          </a:p>
-        </p:txBody>
-      </p:sp>
-      <p:sp>
-        <p:nvSpPr>
-          <p:cNvPr id="5" name="Footer Placeholder 4">
-            <a:extLst>
-              <a:ext uri="{FF2B5EF4-FFF2-40B4-BE49-F238E27FC236}">
-                <a16:creationId xmlns:a16="http://schemas.microsoft.com/office/drawing/2014/main" id="{BE8C0CD5-F70C-4CE2-BE82-8CB3D56E3F1D}"/>
+            <a:endParaRPr lang="en-US"/>
+          </a:p>
+        </p:txBody>
+      </p:sp>
+      <p:sp>
+        <p:nvSpPr>
+          <p:cNvPr id="5" name="Fußzeilenplatzhalter 4">
+            <a:extLst>
+              <a:ext uri="{FF2B5EF4-FFF2-40B4-BE49-F238E27FC236}">
+                <a16:creationId xmlns:a16="http://schemas.microsoft.com/office/drawing/2014/main" id="{DEF41E31-BA96-9D7C-997E-65ACBCD97172}"/>
               </a:ext>
             </a:extLst>
           </p:cNvPr>
@@ -794,16 +1287,16 @@
           <a:bodyPr/>
           <a:lstStyle/>
           <a:p>
-            <a:endParaRPr lang="zh-CN" altLang="en-US"/>
-          </a:p>
-        </p:txBody>
-      </p:sp>
-      <p:sp>
-        <p:nvSpPr>
-          <p:cNvPr id="6" name="Slide Number Placeholder 5">
-            <a:extLst>
-              <a:ext uri="{FF2B5EF4-FFF2-40B4-BE49-F238E27FC236}">
-                <a16:creationId xmlns:a16="http://schemas.microsoft.com/office/drawing/2014/main" id="{B84C0741-4541-4B13-86CA-EA1EBE71575D}"/>
+            <a:endParaRPr lang="en-US"/>
+          </a:p>
+        </p:txBody>
+      </p:sp>
+      <p:sp>
+        <p:nvSpPr>
+          <p:cNvPr id="6" name="Foliennummernplatzhalter 5">
+            <a:extLst>
+              <a:ext uri="{FF2B5EF4-FFF2-40B4-BE49-F238E27FC236}">
+                <a16:creationId xmlns:a16="http://schemas.microsoft.com/office/drawing/2014/main" id="{D27646D1-151A-9D28-0D30-6364247C553C}"/>
               </a:ext>
             </a:extLst>
           </p:cNvPr>
@@ -819,18 +1312,18 @@
           <a:bodyPr/>
           <a:lstStyle/>
           <a:p>
-            <a:fld id="{50E98428-D87D-43E4-BBCA-B5FD8296FA72}" type="slidenum">
-              <a:rPr lang="zh-CN" altLang="en-US" smtClean="0"/>
-              <a:t>‹#›</a:t>
+            <a:fld id="{7A215391-53CE-46CA-B8DB-791AAC6E5119}" type="slidenum">
+              <a:rPr lang="en-US" smtClean="0"/>
+              <a:t>‹Nr.›</a:t>
             </a:fld>
-            <a:endParaRPr lang="zh-CN" altLang="en-US"/>
+            <a:endParaRPr lang="en-US"/>
           </a:p>
         </p:txBody>
       </p:sp>
     </p:spTree>
     <p:extLst>
       <p:ext uri="{BB962C8B-B14F-4D97-AF65-F5344CB8AC3E}">
-        <p14:creationId xmlns:p14="http://schemas.microsoft.com/office/powerpoint/2010/main" val="1346228577"/>
+        <p14:creationId xmlns:p14="http://schemas.microsoft.com/office/powerpoint/2010/main" val="1699510431"/>
       </p:ext>
     </p:extLst>
   </p:cSld>
@@ -842,7 +1335,7 @@
 
 <file path=ppt/slideLayouts/slideLayout10.xml><?xml version="1.0" encoding="utf-8"?>
 <p:sldLayout xmlns:a="http://schemas.openxmlformats.org/drawingml/2006/main" xmlns:r="http://schemas.openxmlformats.org/officeDocument/2006/relationships" xmlns:p="http://schemas.openxmlformats.org/presentationml/2006/main" type="vertTx" preserve="1">
-  <p:cSld name="Title and Vertical Text">
+  <p:cSld name="Titel und vertikaler Text">
     <p:spTree>
       <p:nvGrpSpPr>
         <p:cNvPr id="1" name=""/>
@@ -859,10 +1352,10 @@
       </p:grpSpPr>
       <p:sp>
         <p:nvSpPr>
-          <p:cNvPr id="2" name="Title 1">
-            <a:extLst>
-              <a:ext uri="{FF2B5EF4-FFF2-40B4-BE49-F238E27FC236}">
-                <a16:creationId xmlns:a16="http://schemas.microsoft.com/office/drawing/2014/main" id="{74760CDA-3286-4DFA-AC3E-E7CFD8B18CCA}"/>
+          <p:cNvPr id="2" name="Titel 1">
+            <a:extLst>
+              <a:ext uri="{FF2B5EF4-FFF2-40B4-BE49-F238E27FC236}">
+                <a16:creationId xmlns:a16="http://schemas.microsoft.com/office/drawing/2014/main" id="{517BF216-90F6-DB54-0185-5229CBEA64DB}"/>
               </a:ext>
             </a:extLst>
           </p:cNvPr>
@@ -879,19 +1372,19 @@
           <a:lstStyle/>
           <a:p>
             <a:r>
-              <a:rPr lang="en-US" altLang="zh-CN"/>
-              <a:t>Click to edit Master title style</a:t>
-            </a:r>
-            <a:endParaRPr lang="zh-CN" altLang="en-US"/>
-          </a:p>
-        </p:txBody>
-      </p:sp>
-      <p:sp>
-        <p:nvSpPr>
-          <p:cNvPr id="3" name="Vertical Text Placeholder 2">
-            <a:extLst>
-              <a:ext uri="{FF2B5EF4-FFF2-40B4-BE49-F238E27FC236}">
-                <a16:creationId xmlns:a16="http://schemas.microsoft.com/office/drawing/2014/main" id="{9AFA5628-8F98-4A1B-9213-62BCD1C8F529}"/>
+              <a:rPr lang="de-DE"/>
+              <a:t>Mastertitelformat bearbeiten</a:t>
+            </a:r>
+            <a:endParaRPr lang="en-US"/>
+          </a:p>
+        </p:txBody>
+      </p:sp>
+      <p:sp>
+        <p:nvSpPr>
+          <p:cNvPr id="3" name="Vertikaler Textplatzhalter 2">
+            <a:extLst>
+              <a:ext uri="{FF2B5EF4-FFF2-40B4-BE49-F238E27FC236}">
+                <a16:creationId xmlns:a16="http://schemas.microsoft.com/office/drawing/2014/main" id="{C64BDEF1-B54B-38BE-9EEF-2A5F5A724C64}"/>
               </a:ext>
             </a:extLst>
           </p:cNvPr>
@@ -909,47 +1402,47 @@
           <a:p>
             <a:pPr lvl="0"/>
             <a:r>
-              <a:rPr lang="en-US" altLang="zh-CN"/>
-              <a:t>Click to edit Master text styles</a:t>
+              <a:rPr lang="de-DE"/>
+              <a:t>Mastertextformat bearbeiten</a:t>
             </a:r>
           </a:p>
           <a:p>
             <a:pPr lvl="1"/>
             <a:r>
-              <a:rPr lang="en-US" altLang="zh-CN"/>
-              <a:t>Second level</a:t>
+              <a:rPr lang="de-DE"/>
+              <a:t>Zweite Ebene</a:t>
             </a:r>
           </a:p>
           <a:p>
             <a:pPr lvl="2"/>
             <a:r>
-              <a:rPr lang="en-US" altLang="zh-CN"/>
-              <a:t>Third level</a:t>
+              <a:rPr lang="de-DE"/>
+              <a:t>Dritte Ebene</a:t>
             </a:r>
           </a:p>
           <a:p>
             <a:pPr lvl="3"/>
             <a:r>
-              <a:rPr lang="en-US" altLang="zh-CN"/>
-              <a:t>Fourth level</a:t>
+              <a:rPr lang="de-DE"/>
+              <a:t>Vierte Ebene</a:t>
             </a:r>
           </a:p>
           <a:p>
             <a:pPr lvl="4"/>
             <a:r>
-              <a:rPr lang="en-US" altLang="zh-CN"/>
-              <a:t>Fifth level</a:t>
-            </a:r>
-            <a:endParaRPr lang="zh-CN" altLang="en-US"/>
-          </a:p>
-        </p:txBody>
-      </p:sp>
-      <p:sp>
-        <p:nvSpPr>
-          <p:cNvPr id="4" name="Date Placeholder 3">
-            <a:extLst>
-              <a:ext uri="{FF2B5EF4-FFF2-40B4-BE49-F238E27FC236}">
-                <a16:creationId xmlns:a16="http://schemas.microsoft.com/office/drawing/2014/main" id="{BC1B92FE-8E02-4848-87BF-810BDAB96313}"/>
+              <a:rPr lang="de-DE"/>
+              <a:t>Fünfte Ebene</a:t>
+            </a:r>
+            <a:endParaRPr lang="en-US"/>
+          </a:p>
+        </p:txBody>
+      </p:sp>
+      <p:sp>
+        <p:nvSpPr>
+          <p:cNvPr id="4" name="Datumsplatzhalter 3">
+            <a:extLst>
+              <a:ext uri="{FF2B5EF4-FFF2-40B4-BE49-F238E27FC236}">
+                <a16:creationId xmlns:a16="http://schemas.microsoft.com/office/drawing/2014/main" id="{8A3401F9-1972-9613-9C2A-55405FE081E7}"/>
               </a:ext>
             </a:extLst>
           </p:cNvPr>
@@ -965,20 +1458,20 @@
           <a:bodyPr/>
           <a:lstStyle/>
           <a:p>
-            <a:fld id="{6F9AC78F-69F7-4DFA-9ED3-63209FEF1CF3}" type="datetimeFigureOut">
-              <a:rPr lang="zh-CN" altLang="en-US" smtClean="0"/>
-              <a:t>2020/6/22</a:t>
+            <a:fld id="{D3377326-B63D-4862-9B98-380EE10FA03E}" type="datetimeFigureOut">
+              <a:rPr lang="en-US" smtClean="0"/>
+              <a:t>7/12/2025</a:t>
             </a:fld>
-            <a:endParaRPr lang="zh-CN" altLang="en-US"/>
-          </a:p>
-        </p:txBody>
-      </p:sp>
-      <p:sp>
-        <p:nvSpPr>
-          <p:cNvPr id="5" name="Footer Placeholder 4">
-            <a:extLst>
-              <a:ext uri="{FF2B5EF4-FFF2-40B4-BE49-F238E27FC236}">
-                <a16:creationId xmlns:a16="http://schemas.microsoft.com/office/drawing/2014/main" id="{3C836EE5-EADA-4CB7-8661-5338445789A9}"/>
+            <a:endParaRPr lang="en-US"/>
+          </a:p>
+        </p:txBody>
+      </p:sp>
+      <p:sp>
+        <p:nvSpPr>
+          <p:cNvPr id="5" name="Fußzeilenplatzhalter 4">
+            <a:extLst>
+              <a:ext uri="{FF2B5EF4-FFF2-40B4-BE49-F238E27FC236}">
+                <a16:creationId xmlns:a16="http://schemas.microsoft.com/office/drawing/2014/main" id="{D0BD9DCB-878A-2CF0-ED00-BC9FAF2D9FA0}"/>
               </a:ext>
             </a:extLst>
           </p:cNvPr>
@@ -994,16 +1487,16 @@
           <a:bodyPr/>
           <a:lstStyle/>
           <a:p>
-            <a:endParaRPr lang="zh-CN" altLang="en-US"/>
-          </a:p>
-        </p:txBody>
-      </p:sp>
-      <p:sp>
-        <p:nvSpPr>
-          <p:cNvPr id="6" name="Slide Number Placeholder 5">
-            <a:extLst>
-              <a:ext uri="{FF2B5EF4-FFF2-40B4-BE49-F238E27FC236}">
-                <a16:creationId xmlns:a16="http://schemas.microsoft.com/office/drawing/2014/main" id="{42620723-7CF3-4CA2-B321-D7DE055A9EF4}"/>
+            <a:endParaRPr lang="en-US"/>
+          </a:p>
+        </p:txBody>
+      </p:sp>
+      <p:sp>
+        <p:nvSpPr>
+          <p:cNvPr id="6" name="Foliennummernplatzhalter 5">
+            <a:extLst>
+              <a:ext uri="{FF2B5EF4-FFF2-40B4-BE49-F238E27FC236}">
+                <a16:creationId xmlns:a16="http://schemas.microsoft.com/office/drawing/2014/main" id="{9A7E90AD-7DC3-FC8E-4101-37ACDA3CDE45}"/>
               </a:ext>
             </a:extLst>
           </p:cNvPr>
@@ -1019,18 +1512,18 @@
           <a:bodyPr/>
           <a:lstStyle/>
           <a:p>
-            <a:fld id="{50E98428-D87D-43E4-BBCA-B5FD8296FA72}" type="slidenum">
-              <a:rPr lang="zh-CN" altLang="en-US" smtClean="0"/>
-              <a:t>‹#›</a:t>
+            <a:fld id="{7A215391-53CE-46CA-B8DB-791AAC6E5119}" type="slidenum">
+              <a:rPr lang="en-US" smtClean="0"/>
+              <a:t>‹Nr.›</a:t>
             </a:fld>
-            <a:endParaRPr lang="zh-CN" altLang="en-US"/>
+            <a:endParaRPr lang="en-US"/>
           </a:p>
         </p:txBody>
       </p:sp>
     </p:spTree>
     <p:extLst>
       <p:ext uri="{BB962C8B-B14F-4D97-AF65-F5344CB8AC3E}">
-        <p14:creationId xmlns:p14="http://schemas.microsoft.com/office/powerpoint/2010/main" val="1186211366"/>
+        <p14:creationId xmlns:p14="http://schemas.microsoft.com/office/powerpoint/2010/main" val="905975477"/>
       </p:ext>
     </p:extLst>
   </p:cSld>
@@ -1042,7 +1535,7 @@
 
 <file path=ppt/slideLayouts/slideLayout11.xml><?xml version="1.0" encoding="utf-8"?>
 <p:sldLayout xmlns:a="http://schemas.openxmlformats.org/drawingml/2006/main" xmlns:r="http://schemas.openxmlformats.org/officeDocument/2006/relationships" xmlns:p="http://schemas.openxmlformats.org/presentationml/2006/main" type="vertTitleAndTx" preserve="1">
-  <p:cSld name="Vertical Title and Text">
+  <p:cSld name="Vertikaler Titel und Text">
     <p:spTree>
       <p:nvGrpSpPr>
         <p:cNvPr id="1" name=""/>
@@ -1059,10 +1552,10 @@
       </p:grpSpPr>
       <p:sp>
         <p:nvSpPr>
-          <p:cNvPr id="2" name="Vertical Title 1">
-            <a:extLst>
-              <a:ext uri="{FF2B5EF4-FFF2-40B4-BE49-F238E27FC236}">
-                <a16:creationId xmlns:a16="http://schemas.microsoft.com/office/drawing/2014/main" id="{BC5925B4-2ED3-4453-BD3C-E54B9A20C3CF}"/>
+          <p:cNvPr id="2" name="Vertikaler Titel 1">
+            <a:extLst>
+              <a:ext uri="{FF2B5EF4-FFF2-40B4-BE49-F238E27FC236}">
+                <a16:creationId xmlns:a16="http://schemas.microsoft.com/office/drawing/2014/main" id="{4B7355EE-C74E-1E22-3E73-50780AC65BB4}"/>
               </a:ext>
             </a:extLst>
           </p:cNvPr>
@@ -1084,19 +1577,19 @@
           <a:lstStyle/>
           <a:p>
             <a:r>
-              <a:rPr lang="en-US" altLang="zh-CN"/>
-              <a:t>Click to edit Master title style</a:t>
-            </a:r>
-            <a:endParaRPr lang="zh-CN" altLang="en-US"/>
-          </a:p>
-        </p:txBody>
-      </p:sp>
-      <p:sp>
-        <p:nvSpPr>
-          <p:cNvPr id="3" name="Vertical Text Placeholder 2">
-            <a:extLst>
-              <a:ext uri="{FF2B5EF4-FFF2-40B4-BE49-F238E27FC236}">
-                <a16:creationId xmlns:a16="http://schemas.microsoft.com/office/drawing/2014/main" id="{BA10E1F8-7008-48D2-8703-BEC7B0C8FA24}"/>
+              <a:rPr lang="de-DE"/>
+              <a:t>Mastertitelformat bearbeiten</a:t>
+            </a:r>
+            <a:endParaRPr lang="en-US"/>
+          </a:p>
+        </p:txBody>
+      </p:sp>
+      <p:sp>
+        <p:nvSpPr>
+          <p:cNvPr id="3" name="Vertikaler Textplatzhalter 2">
+            <a:extLst>
+              <a:ext uri="{FF2B5EF4-FFF2-40B4-BE49-F238E27FC236}">
+                <a16:creationId xmlns:a16="http://schemas.microsoft.com/office/drawing/2014/main" id="{F79EE625-5FDD-4567-0C56-F3677BC6EB76}"/>
               </a:ext>
             </a:extLst>
           </p:cNvPr>
@@ -1119,47 +1612,47 @@
           <a:p>
             <a:pPr lvl="0"/>
             <a:r>
-              <a:rPr lang="en-US" altLang="zh-CN"/>
-              <a:t>Click to edit Master text styles</a:t>
+              <a:rPr lang="de-DE"/>
+              <a:t>Mastertextformat bearbeiten</a:t>
             </a:r>
           </a:p>
           <a:p>
             <a:pPr lvl="1"/>
             <a:r>
-              <a:rPr lang="en-US" altLang="zh-CN"/>
-              <a:t>Second level</a:t>
+              <a:rPr lang="de-DE"/>
+              <a:t>Zweite Ebene</a:t>
             </a:r>
           </a:p>
           <a:p>
             <a:pPr lvl="2"/>
             <a:r>
-              <a:rPr lang="en-US" altLang="zh-CN"/>
-              <a:t>Third level</a:t>
+              <a:rPr lang="de-DE"/>
+              <a:t>Dritte Ebene</a:t>
             </a:r>
           </a:p>
           <a:p>
             <a:pPr lvl="3"/>
             <a:r>
-              <a:rPr lang="en-US" altLang="zh-CN"/>
-              <a:t>Fourth level</a:t>
+              <a:rPr lang="de-DE"/>
+              <a:t>Vierte Ebene</a:t>
             </a:r>
           </a:p>
           <a:p>
             <a:pPr lvl="4"/>
             <a:r>
-              <a:rPr lang="en-US" altLang="zh-CN"/>
-              <a:t>Fifth level</a:t>
-            </a:r>
-            <a:endParaRPr lang="zh-CN" altLang="en-US"/>
-          </a:p>
-        </p:txBody>
-      </p:sp>
-      <p:sp>
-        <p:nvSpPr>
-          <p:cNvPr id="4" name="Date Placeholder 3">
-            <a:extLst>
-              <a:ext uri="{FF2B5EF4-FFF2-40B4-BE49-F238E27FC236}">
-                <a16:creationId xmlns:a16="http://schemas.microsoft.com/office/drawing/2014/main" id="{954A0139-281E-4EE1-9D11-F0EF7A5E79A7}"/>
+              <a:rPr lang="de-DE"/>
+              <a:t>Fünfte Ebene</a:t>
+            </a:r>
+            <a:endParaRPr lang="en-US"/>
+          </a:p>
+        </p:txBody>
+      </p:sp>
+      <p:sp>
+        <p:nvSpPr>
+          <p:cNvPr id="4" name="Datumsplatzhalter 3">
+            <a:extLst>
+              <a:ext uri="{FF2B5EF4-FFF2-40B4-BE49-F238E27FC236}">
+                <a16:creationId xmlns:a16="http://schemas.microsoft.com/office/drawing/2014/main" id="{986F5EC1-13C3-21F1-D569-E7F53CD0513E}"/>
               </a:ext>
             </a:extLst>
           </p:cNvPr>
@@ -1175,20 +1668,20 @@
           <a:bodyPr/>
           <a:lstStyle/>
           <a:p>
-            <a:fld id="{6F9AC78F-69F7-4DFA-9ED3-63209FEF1CF3}" type="datetimeFigureOut">
-              <a:rPr lang="zh-CN" altLang="en-US" smtClean="0"/>
-              <a:t>2020/6/22</a:t>
+            <a:fld id="{D3377326-B63D-4862-9B98-380EE10FA03E}" type="datetimeFigureOut">
+              <a:rPr lang="en-US" smtClean="0"/>
+              <a:t>7/12/2025</a:t>
             </a:fld>
-            <a:endParaRPr lang="zh-CN" altLang="en-US"/>
-          </a:p>
-        </p:txBody>
-      </p:sp>
-      <p:sp>
-        <p:nvSpPr>
-          <p:cNvPr id="5" name="Footer Placeholder 4">
-            <a:extLst>
-              <a:ext uri="{FF2B5EF4-FFF2-40B4-BE49-F238E27FC236}">
-                <a16:creationId xmlns:a16="http://schemas.microsoft.com/office/drawing/2014/main" id="{F92AEBB9-B70B-4494-AAB7-C08E19C34B0E}"/>
+            <a:endParaRPr lang="en-US"/>
+          </a:p>
+        </p:txBody>
+      </p:sp>
+      <p:sp>
+        <p:nvSpPr>
+          <p:cNvPr id="5" name="Fußzeilenplatzhalter 4">
+            <a:extLst>
+              <a:ext uri="{FF2B5EF4-FFF2-40B4-BE49-F238E27FC236}">
+                <a16:creationId xmlns:a16="http://schemas.microsoft.com/office/drawing/2014/main" id="{456B7D75-809A-1945-7F66-ED06E1D219CF}"/>
               </a:ext>
             </a:extLst>
           </p:cNvPr>
@@ -1204,16 +1697,16 @@
           <a:bodyPr/>
           <a:lstStyle/>
           <a:p>
-            <a:endParaRPr lang="zh-CN" altLang="en-US"/>
-          </a:p>
-        </p:txBody>
-      </p:sp>
-      <p:sp>
-        <p:nvSpPr>
-          <p:cNvPr id="6" name="Slide Number Placeholder 5">
-            <a:extLst>
-              <a:ext uri="{FF2B5EF4-FFF2-40B4-BE49-F238E27FC236}">
-                <a16:creationId xmlns:a16="http://schemas.microsoft.com/office/drawing/2014/main" id="{F1F21F28-908A-49A0-B879-CC419D601253}"/>
+            <a:endParaRPr lang="en-US"/>
+          </a:p>
+        </p:txBody>
+      </p:sp>
+      <p:sp>
+        <p:nvSpPr>
+          <p:cNvPr id="6" name="Foliennummernplatzhalter 5">
+            <a:extLst>
+              <a:ext uri="{FF2B5EF4-FFF2-40B4-BE49-F238E27FC236}">
+                <a16:creationId xmlns:a16="http://schemas.microsoft.com/office/drawing/2014/main" id="{C526412B-ADEC-C085-7A93-2DAB9C8A79C1}"/>
               </a:ext>
             </a:extLst>
           </p:cNvPr>
@@ -1229,18 +1722,18 @@
           <a:bodyPr/>
           <a:lstStyle/>
           <a:p>
-            <a:fld id="{50E98428-D87D-43E4-BBCA-B5FD8296FA72}" type="slidenum">
-              <a:rPr lang="zh-CN" altLang="en-US" smtClean="0"/>
-              <a:t>‹#›</a:t>
+            <a:fld id="{7A215391-53CE-46CA-B8DB-791AAC6E5119}" type="slidenum">
+              <a:rPr lang="en-US" smtClean="0"/>
+              <a:t>‹Nr.›</a:t>
             </a:fld>
-            <a:endParaRPr lang="zh-CN" altLang="en-US"/>
+            <a:endParaRPr lang="en-US"/>
           </a:p>
         </p:txBody>
       </p:sp>
     </p:spTree>
     <p:extLst>
       <p:ext uri="{BB962C8B-B14F-4D97-AF65-F5344CB8AC3E}">
-        <p14:creationId xmlns:p14="http://schemas.microsoft.com/office/powerpoint/2010/main" val="3433810322"/>
+        <p14:creationId xmlns:p14="http://schemas.microsoft.com/office/powerpoint/2010/main" val="2505431111"/>
       </p:ext>
     </p:extLst>
   </p:cSld>
@@ -1252,7 +1745,7 @@
 
 <file path=ppt/slideLayouts/slideLayout2.xml><?xml version="1.0" encoding="utf-8"?>
 <p:sldLayout xmlns:a="http://schemas.openxmlformats.org/drawingml/2006/main" xmlns:r="http://schemas.openxmlformats.org/officeDocument/2006/relationships" xmlns:p="http://schemas.openxmlformats.org/presentationml/2006/main" type="obj" preserve="1">
-  <p:cSld name="Title and Content">
+  <p:cSld name="Titel und Inhalt">
     <p:spTree>
       <p:nvGrpSpPr>
         <p:cNvPr id="1" name=""/>
@@ -1269,10 +1762,10 @@
       </p:grpSpPr>
       <p:sp>
         <p:nvSpPr>
-          <p:cNvPr id="2" name="Title 1">
-            <a:extLst>
-              <a:ext uri="{FF2B5EF4-FFF2-40B4-BE49-F238E27FC236}">
-                <a16:creationId xmlns:a16="http://schemas.microsoft.com/office/drawing/2014/main" id="{0A1B5F82-83A6-4F37-BF81-E3BE2D2D2EC4}"/>
+          <p:cNvPr id="2" name="Titel 1">
+            <a:extLst>
+              <a:ext uri="{FF2B5EF4-FFF2-40B4-BE49-F238E27FC236}">
+                <a16:creationId xmlns:a16="http://schemas.microsoft.com/office/drawing/2014/main" id="{1DE8783F-BE8E-ABF1-388F-68724147DAD2}"/>
               </a:ext>
             </a:extLst>
           </p:cNvPr>
@@ -1289,19 +1782,19 @@
           <a:lstStyle/>
           <a:p>
             <a:r>
-              <a:rPr lang="en-US" altLang="zh-CN"/>
-              <a:t>Click to edit Master title style</a:t>
-            </a:r>
-            <a:endParaRPr lang="zh-CN" altLang="en-US"/>
-          </a:p>
-        </p:txBody>
-      </p:sp>
-      <p:sp>
-        <p:nvSpPr>
-          <p:cNvPr id="3" name="Content Placeholder 2">
-            <a:extLst>
-              <a:ext uri="{FF2B5EF4-FFF2-40B4-BE49-F238E27FC236}">
-                <a16:creationId xmlns:a16="http://schemas.microsoft.com/office/drawing/2014/main" id="{677716B6-50AB-418B-9111-7D9E4AA992E1}"/>
+              <a:rPr lang="de-DE"/>
+              <a:t>Mastertitelformat bearbeiten</a:t>
+            </a:r>
+            <a:endParaRPr lang="en-US"/>
+          </a:p>
+        </p:txBody>
+      </p:sp>
+      <p:sp>
+        <p:nvSpPr>
+          <p:cNvPr id="3" name="Inhaltsplatzhalter 2">
+            <a:extLst>
+              <a:ext uri="{FF2B5EF4-FFF2-40B4-BE49-F238E27FC236}">
+                <a16:creationId xmlns:a16="http://schemas.microsoft.com/office/drawing/2014/main" id="{1454EED5-109F-1748-19AF-20245B540EF7}"/>
               </a:ext>
             </a:extLst>
           </p:cNvPr>
@@ -1319,47 +1812,47 @@
           <a:p>
             <a:pPr lvl="0"/>
             <a:r>
-              <a:rPr lang="en-US" altLang="zh-CN"/>
-              <a:t>Click to edit Master text styles</a:t>
+              <a:rPr lang="de-DE"/>
+              <a:t>Mastertextformat bearbeiten</a:t>
             </a:r>
           </a:p>
           <a:p>
             <a:pPr lvl="1"/>
             <a:r>
-              <a:rPr lang="en-US" altLang="zh-CN"/>
-              <a:t>Second level</a:t>
+              <a:rPr lang="de-DE"/>
+              <a:t>Zweite Ebene</a:t>
             </a:r>
           </a:p>
           <a:p>
             <a:pPr lvl="2"/>
             <a:r>
-              <a:rPr lang="en-US" altLang="zh-CN"/>
-              <a:t>Third level</a:t>
+              <a:rPr lang="de-DE"/>
+              <a:t>Dritte Ebene</a:t>
             </a:r>
           </a:p>
           <a:p>
             <a:pPr lvl="3"/>
             <a:r>
-              <a:rPr lang="en-US" altLang="zh-CN"/>
-              <a:t>Fourth level</a:t>
+              <a:rPr lang="de-DE"/>
+              <a:t>Vierte Ebene</a:t>
             </a:r>
           </a:p>
           <a:p>
             <a:pPr lvl="4"/>
             <a:r>
-              <a:rPr lang="en-US" altLang="zh-CN"/>
-              <a:t>Fifth level</a:t>
-            </a:r>
-            <a:endParaRPr lang="zh-CN" altLang="en-US"/>
-          </a:p>
-        </p:txBody>
-      </p:sp>
-      <p:sp>
-        <p:nvSpPr>
-          <p:cNvPr id="4" name="Date Placeholder 3">
-            <a:extLst>
-              <a:ext uri="{FF2B5EF4-FFF2-40B4-BE49-F238E27FC236}">
-                <a16:creationId xmlns:a16="http://schemas.microsoft.com/office/drawing/2014/main" id="{F02AD4D7-46D3-4D78-8A4A-325A27E12C40}"/>
+              <a:rPr lang="de-DE"/>
+              <a:t>Fünfte Ebene</a:t>
+            </a:r>
+            <a:endParaRPr lang="en-US"/>
+          </a:p>
+        </p:txBody>
+      </p:sp>
+      <p:sp>
+        <p:nvSpPr>
+          <p:cNvPr id="4" name="Datumsplatzhalter 3">
+            <a:extLst>
+              <a:ext uri="{FF2B5EF4-FFF2-40B4-BE49-F238E27FC236}">
+                <a16:creationId xmlns:a16="http://schemas.microsoft.com/office/drawing/2014/main" id="{CE75D2C9-43A9-B92F-687C-8804F225BF94}"/>
               </a:ext>
             </a:extLst>
           </p:cNvPr>
@@ -1375,20 +1868,20 @@
           <a:bodyPr/>
           <a:lstStyle/>
           <a:p>
-            <a:fld id="{6F9AC78F-69F7-4DFA-9ED3-63209FEF1CF3}" type="datetimeFigureOut">
-              <a:rPr lang="zh-CN" altLang="en-US" smtClean="0"/>
-              <a:t>2020/6/22</a:t>
+            <a:fld id="{D3377326-B63D-4862-9B98-380EE10FA03E}" type="datetimeFigureOut">
+              <a:rPr lang="en-US" smtClean="0"/>
+              <a:t>7/12/2025</a:t>
             </a:fld>
-            <a:endParaRPr lang="zh-CN" altLang="en-US"/>
-          </a:p>
-        </p:txBody>
-      </p:sp>
-      <p:sp>
-        <p:nvSpPr>
-          <p:cNvPr id="5" name="Footer Placeholder 4">
-            <a:extLst>
-              <a:ext uri="{FF2B5EF4-FFF2-40B4-BE49-F238E27FC236}">
-                <a16:creationId xmlns:a16="http://schemas.microsoft.com/office/drawing/2014/main" id="{72A95639-6891-4108-A3BB-85DF6D277898}"/>
+            <a:endParaRPr lang="en-US"/>
+          </a:p>
+        </p:txBody>
+      </p:sp>
+      <p:sp>
+        <p:nvSpPr>
+          <p:cNvPr id="5" name="Fußzeilenplatzhalter 4">
+            <a:extLst>
+              <a:ext uri="{FF2B5EF4-FFF2-40B4-BE49-F238E27FC236}">
+                <a16:creationId xmlns:a16="http://schemas.microsoft.com/office/drawing/2014/main" id="{15BEE766-633C-42B3-B1CF-AF35D97F3AA2}"/>
               </a:ext>
             </a:extLst>
           </p:cNvPr>
@@ -1404,16 +1897,16 @@
           <a:bodyPr/>
           <a:lstStyle/>
           <a:p>
-            <a:endParaRPr lang="zh-CN" altLang="en-US"/>
-          </a:p>
-        </p:txBody>
-      </p:sp>
-      <p:sp>
-        <p:nvSpPr>
-          <p:cNvPr id="6" name="Slide Number Placeholder 5">
-            <a:extLst>
-              <a:ext uri="{FF2B5EF4-FFF2-40B4-BE49-F238E27FC236}">
-                <a16:creationId xmlns:a16="http://schemas.microsoft.com/office/drawing/2014/main" id="{098C5F4F-9932-4A7D-8D67-5009E3E6E3A5}"/>
+            <a:endParaRPr lang="en-US"/>
+          </a:p>
+        </p:txBody>
+      </p:sp>
+      <p:sp>
+        <p:nvSpPr>
+          <p:cNvPr id="6" name="Foliennummernplatzhalter 5">
+            <a:extLst>
+              <a:ext uri="{FF2B5EF4-FFF2-40B4-BE49-F238E27FC236}">
+                <a16:creationId xmlns:a16="http://schemas.microsoft.com/office/drawing/2014/main" id="{5B74AEA9-F099-4D6C-271E-BE38519560C2}"/>
               </a:ext>
             </a:extLst>
           </p:cNvPr>
@@ -1429,18 +1922,18 @@
           <a:bodyPr/>
           <a:lstStyle/>
           <a:p>
-            <a:fld id="{50E98428-D87D-43E4-BBCA-B5FD8296FA72}" type="slidenum">
-              <a:rPr lang="zh-CN" altLang="en-US" smtClean="0"/>
-              <a:t>‹#›</a:t>
+            <a:fld id="{7A215391-53CE-46CA-B8DB-791AAC6E5119}" type="slidenum">
+              <a:rPr lang="en-US" smtClean="0"/>
+              <a:t>‹Nr.›</a:t>
             </a:fld>
-            <a:endParaRPr lang="zh-CN" altLang="en-US"/>
+            <a:endParaRPr lang="en-US"/>
           </a:p>
         </p:txBody>
       </p:sp>
     </p:spTree>
     <p:extLst>
       <p:ext uri="{BB962C8B-B14F-4D97-AF65-F5344CB8AC3E}">
-        <p14:creationId xmlns:p14="http://schemas.microsoft.com/office/powerpoint/2010/main" val="3660929080"/>
+        <p14:creationId xmlns:p14="http://schemas.microsoft.com/office/powerpoint/2010/main" val="325603864"/>
       </p:ext>
     </p:extLst>
   </p:cSld>
@@ -1452,7 +1945,7 @@
 
 <file path=ppt/slideLayouts/slideLayout3.xml><?xml version="1.0" encoding="utf-8"?>
 <p:sldLayout xmlns:a="http://schemas.openxmlformats.org/drawingml/2006/main" xmlns:r="http://schemas.openxmlformats.org/officeDocument/2006/relationships" xmlns:p="http://schemas.openxmlformats.org/presentationml/2006/main" type="secHead" preserve="1">
-  <p:cSld name="Section Header">
+  <p:cSld name="Abschnitts-&#10;überschrift">
     <p:spTree>
       <p:nvGrpSpPr>
         <p:cNvPr id="1" name=""/>
@@ -1469,10 +1962,10 @@
       </p:grpSpPr>
       <p:sp>
         <p:nvSpPr>
-          <p:cNvPr id="2" name="Title 1">
-            <a:extLst>
-              <a:ext uri="{FF2B5EF4-FFF2-40B4-BE49-F238E27FC236}">
-                <a16:creationId xmlns:a16="http://schemas.microsoft.com/office/drawing/2014/main" id="{A19796B4-ACE0-46AC-9E4A-33297D15979B}"/>
+          <p:cNvPr id="2" name="Titel 1">
+            <a:extLst>
+              <a:ext uri="{FF2B5EF4-FFF2-40B4-BE49-F238E27FC236}">
+                <a16:creationId xmlns:a16="http://schemas.microsoft.com/office/drawing/2014/main" id="{C8727114-60C4-BCD5-1C32-58B13ECF1205}"/>
               </a:ext>
             </a:extLst>
           </p:cNvPr>
@@ -1498,19 +1991,19 @@
           </a:lstStyle>
           <a:p>
             <a:r>
-              <a:rPr lang="en-US" altLang="zh-CN"/>
-              <a:t>Click to edit Master title style</a:t>
-            </a:r>
-            <a:endParaRPr lang="zh-CN" altLang="en-US"/>
-          </a:p>
-        </p:txBody>
-      </p:sp>
-      <p:sp>
-        <p:nvSpPr>
-          <p:cNvPr id="3" name="Text Placeholder 2">
-            <a:extLst>
-              <a:ext uri="{FF2B5EF4-FFF2-40B4-BE49-F238E27FC236}">
-                <a16:creationId xmlns:a16="http://schemas.microsoft.com/office/drawing/2014/main" id="{D0D42477-60BD-40F4-9EB8-6A9E5E729207}"/>
+              <a:rPr lang="de-DE"/>
+              <a:t>Mastertitelformat bearbeiten</a:t>
+            </a:r>
+            <a:endParaRPr lang="en-US"/>
+          </a:p>
+        </p:txBody>
+      </p:sp>
+      <p:sp>
+        <p:nvSpPr>
+          <p:cNvPr id="3" name="Textplatzhalter 2">
+            <a:extLst>
+              <a:ext uri="{FF2B5EF4-FFF2-40B4-BE49-F238E27FC236}">
+                <a16:creationId xmlns:a16="http://schemas.microsoft.com/office/drawing/2014/main" id="{6A5DB238-C62D-6BB7-294D-207F34FC208C}"/>
               </a:ext>
             </a:extLst>
           </p:cNvPr>
@@ -1535,7 +2028,7 @@
               <a:defRPr sz="2400">
                 <a:solidFill>
                   <a:schemeClr val="tx1">
-                    <a:tint val="75000"/>
+                    <a:tint val="82000"/>
                   </a:schemeClr>
                 </a:solidFill>
               </a:defRPr>
@@ -1545,7 +2038,7 @@
               <a:defRPr sz="2000">
                 <a:solidFill>
                   <a:schemeClr val="tx1">
-                    <a:tint val="75000"/>
+                    <a:tint val="82000"/>
                   </a:schemeClr>
                 </a:solidFill>
               </a:defRPr>
@@ -1555,7 +2048,7 @@
               <a:defRPr sz="1800">
                 <a:solidFill>
                   <a:schemeClr val="tx1">
-                    <a:tint val="75000"/>
+                    <a:tint val="82000"/>
                   </a:schemeClr>
                 </a:solidFill>
               </a:defRPr>
@@ -1565,7 +2058,7 @@
               <a:defRPr sz="1600">
                 <a:solidFill>
                   <a:schemeClr val="tx1">
-                    <a:tint val="75000"/>
+                    <a:tint val="82000"/>
                   </a:schemeClr>
                 </a:solidFill>
               </a:defRPr>
@@ -1575,7 +2068,7 @@
               <a:defRPr sz="1600">
                 <a:solidFill>
                   <a:schemeClr val="tx1">
-                    <a:tint val="75000"/>
+                    <a:tint val="82000"/>
                   </a:schemeClr>
                 </a:solidFill>
               </a:defRPr>
@@ -1585,7 +2078,7 @@
               <a:defRPr sz="1600">
                 <a:solidFill>
                   <a:schemeClr val="tx1">
-                    <a:tint val="75000"/>
+                    <a:tint val="82000"/>
                   </a:schemeClr>
                 </a:solidFill>
               </a:defRPr>
@@ -1595,7 +2088,7 @@
               <a:defRPr sz="1600">
                 <a:solidFill>
                   <a:schemeClr val="tx1">
-                    <a:tint val="75000"/>
+                    <a:tint val="82000"/>
                   </a:schemeClr>
                 </a:solidFill>
               </a:defRPr>
@@ -1605,7 +2098,7 @@
               <a:defRPr sz="1600">
                 <a:solidFill>
                   <a:schemeClr val="tx1">
-                    <a:tint val="75000"/>
+                    <a:tint val="82000"/>
                   </a:schemeClr>
                 </a:solidFill>
               </a:defRPr>
@@ -1615,7 +2108,7 @@
               <a:defRPr sz="1600">
                 <a:solidFill>
                   <a:schemeClr val="tx1">
-                    <a:tint val="75000"/>
+                    <a:tint val="82000"/>
                   </a:schemeClr>
                 </a:solidFill>
               </a:defRPr>
@@ -1624,18 +2117,18 @@
           <a:p>
             <a:pPr lvl="0"/>
             <a:r>
-              <a:rPr lang="en-US" altLang="zh-CN"/>
-              <a:t>Click to edit Master text styles</a:t>
-            </a:r>
-          </a:p>
-        </p:txBody>
-      </p:sp>
-      <p:sp>
-        <p:nvSpPr>
-          <p:cNvPr id="4" name="Date Placeholder 3">
-            <a:extLst>
-              <a:ext uri="{FF2B5EF4-FFF2-40B4-BE49-F238E27FC236}">
-                <a16:creationId xmlns:a16="http://schemas.microsoft.com/office/drawing/2014/main" id="{F915B0D5-5F30-4C1C-AE4F-C816B3FAB29A}"/>
+              <a:rPr lang="de-DE"/>
+              <a:t>Mastertextformat bearbeiten</a:t>
+            </a:r>
+          </a:p>
+        </p:txBody>
+      </p:sp>
+      <p:sp>
+        <p:nvSpPr>
+          <p:cNvPr id="4" name="Datumsplatzhalter 3">
+            <a:extLst>
+              <a:ext uri="{FF2B5EF4-FFF2-40B4-BE49-F238E27FC236}">
+                <a16:creationId xmlns:a16="http://schemas.microsoft.com/office/drawing/2014/main" id="{88BC0FA3-3A8C-DC4A-F4C3-37DD03E42E43}"/>
               </a:ext>
             </a:extLst>
           </p:cNvPr>
@@ -1651,20 +2144,20 @@
           <a:bodyPr/>
           <a:lstStyle/>
           <a:p>
-            <a:fld id="{6F9AC78F-69F7-4DFA-9ED3-63209FEF1CF3}" type="datetimeFigureOut">
-              <a:rPr lang="zh-CN" altLang="en-US" smtClean="0"/>
-              <a:t>2020/6/22</a:t>
+            <a:fld id="{D3377326-B63D-4862-9B98-380EE10FA03E}" type="datetimeFigureOut">
+              <a:rPr lang="en-US" smtClean="0"/>
+              <a:t>7/12/2025</a:t>
             </a:fld>
-            <a:endParaRPr lang="zh-CN" altLang="en-US"/>
-          </a:p>
-        </p:txBody>
-      </p:sp>
-      <p:sp>
-        <p:nvSpPr>
-          <p:cNvPr id="5" name="Footer Placeholder 4">
-            <a:extLst>
-              <a:ext uri="{FF2B5EF4-FFF2-40B4-BE49-F238E27FC236}">
-                <a16:creationId xmlns:a16="http://schemas.microsoft.com/office/drawing/2014/main" id="{C2472A4D-D06F-4945-92AC-D8B372D3A0B3}"/>
+            <a:endParaRPr lang="en-US"/>
+          </a:p>
+        </p:txBody>
+      </p:sp>
+      <p:sp>
+        <p:nvSpPr>
+          <p:cNvPr id="5" name="Fußzeilenplatzhalter 4">
+            <a:extLst>
+              <a:ext uri="{FF2B5EF4-FFF2-40B4-BE49-F238E27FC236}">
+                <a16:creationId xmlns:a16="http://schemas.microsoft.com/office/drawing/2014/main" id="{8A4A771F-7CA9-A4C5-F302-1B100888421F}"/>
               </a:ext>
             </a:extLst>
           </p:cNvPr>
@@ -1680,16 +2173,16 @@
           <a:bodyPr/>
           <a:lstStyle/>
           <a:p>
-            <a:endParaRPr lang="zh-CN" altLang="en-US"/>
-          </a:p>
-        </p:txBody>
-      </p:sp>
-      <p:sp>
-        <p:nvSpPr>
-          <p:cNvPr id="6" name="Slide Number Placeholder 5">
-            <a:extLst>
-              <a:ext uri="{FF2B5EF4-FFF2-40B4-BE49-F238E27FC236}">
-                <a16:creationId xmlns:a16="http://schemas.microsoft.com/office/drawing/2014/main" id="{2D57BCE0-3C14-49CE-A84C-72188835093C}"/>
+            <a:endParaRPr lang="en-US"/>
+          </a:p>
+        </p:txBody>
+      </p:sp>
+      <p:sp>
+        <p:nvSpPr>
+          <p:cNvPr id="6" name="Foliennummernplatzhalter 5">
+            <a:extLst>
+              <a:ext uri="{FF2B5EF4-FFF2-40B4-BE49-F238E27FC236}">
+                <a16:creationId xmlns:a16="http://schemas.microsoft.com/office/drawing/2014/main" id="{F4277498-FB20-E14B-84C1-98C012BDCCA0}"/>
               </a:ext>
             </a:extLst>
           </p:cNvPr>
@@ -1705,18 +2198,18 @@
           <a:bodyPr/>
           <a:lstStyle/>
           <a:p>
-            <a:fld id="{50E98428-D87D-43E4-BBCA-B5FD8296FA72}" type="slidenum">
-              <a:rPr lang="zh-CN" altLang="en-US" smtClean="0"/>
-              <a:t>‹#›</a:t>
+            <a:fld id="{7A215391-53CE-46CA-B8DB-791AAC6E5119}" type="slidenum">
+              <a:rPr lang="en-US" smtClean="0"/>
+              <a:t>‹Nr.›</a:t>
             </a:fld>
-            <a:endParaRPr lang="zh-CN" altLang="en-US"/>
+            <a:endParaRPr lang="en-US"/>
           </a:p>
         </p:txBody>
       </p:sp>
     </p:spTree>
     <p:extLst>
       <p:ext uri="{BB962C8B-B14F-4D97-AF65-F5344CB8AC3E}">
-        <p14:creationId xmlns:p14="http://schemas.microsoft.com/office/powerpoint/2010/main" val="839579570"/>
+        <p14:creationId xmlns:p14="http://schemas.microsoft.com/office/powerpoint/2010/main" val="1671401066"/>
       </p:ext>
     </p:extLst>
   </p:cSld>
@@ -1728,7 +2221,7 @@
 
 <file path=ppt/slideLayouts/slideLayout4.xml><?xml version="1.0" encoding="utf-8"?>
 <p:sldLayout xmlns:a="http://schemas.openxmlformats.org/drawingml/2006/main" xmlns:r="http://schemas.openxmlformats.org/officeDocument/2006/relationships" xmlns:p="http://schemas.openxmlformats.org/presentationml/2006/main" type="twoObj" preserve="1">
-  <p:cSld name="Two Content">
+  <p:cSld name="Zwei Inhalte">
     <p:spTree>
       <p:nvGrpSpPr>
         <p:cNvPr id="1" name=""/>
@@ -1745,10 +2238,10 @@
       </p:grpSpPr>
       <p:sp>
         <p:nvSpPr>
-          <p:cNvPr id="2" name="Title 1">
-            <a:extLst>
-              <a:ext uri="{FF2B5EF4-FFF2-40B4-BE49-F238E27FC236}">
-                <a16:creationId xmlns:a16="http://schemas.microsoft.com/office/drawing/2014/main" id="{E684972D-1509-48FF-B60A-F5A222DB56D2}"/>
+          <p:cNvPr id="2" name="Titel 1">
+            <a:extLst>
+              <a:ext uri="{FF2B5EF4-FFF2-40B4-BE49-F238E27FC236}">
+                <a16:creationId xmlns:a16="http://schemas.microsoft.com/office/drawing/2014/main" id="{F1A10263-DD98-5C60-A015-8D399A0E5A4D}"/>
               </a:ext>
             </a:extLst>
           </p:cNvPr>
@@ -1765,19 +2258,19 @@
           <a:lstStyle/>
           <a:p>
             <a:r>
-              <a:rPr lang="en-US" altLang="zh-CN"/>
-              <a:t>Click to edit Master title style</a:t>
-            </a:r>
-            <a:endParaRPr lang="zh-CN" altLang="en-US"/>
-          </a:p>
-        </p:txBody>
-      </p:sp>
-      <p:sp>
-        <p:nvSpPr>
-          <p:cNvPr id="3" name="Content Placeholder 2">
-            <a:extLst>
-              <a:ext uri="{FF2B5EF4-FFF2-40B4-BE49-F238E27FC236}">
-                <a16:creationId xmlns:a16="http://schemas.microsoft.com/office/drawing/2014/main" id="{DCE45B35-ECC0-4A3C-89DE-E58831E34DBD}"/>
+              <a:rPr lang="de-DE"/>
+              <a:t>Mastertitelformat bearbeiten</a:t>
+            </a:r>
+            <a:endParaRPr lang="en-US"/>
+          </a:p>
+        </p:txBody>
+      </p:sp>
+      <p:sp>
+        <p:nvSpPr>
+          <p:cNvPr id="3" name="Inhaltsplatzhalter 2">
+            <a:extLst>
+              <a:ext uri="{FF2B5EF4-FFF2-40B4-BE49-F238E27FC236}">
+                <a16:creationId xmlns:a16="http://schemas.microsoft.com/office/drawing/2014/main" id="{EA53ABF1-8016-4F9E-B7B0-438C63034C91}"/>
               </a:ext>
             </a:extLst>
           </p:cNvPr>
@@ -1800,47 +2293,47 @@
           <a:p>
             <a:pPr lvl="0"/>
             <a:r>
-              <a:rPr lang="en-US" altLang="zh-CN"/>
-              <a:t>Click to edit Master text styles</a:t>
+              <a:rPr lang="de-DE"/>
+              <a:t>Mastertextformat bearbeiten</a:t>
             </a:r>
           </a:p>
           <a:p>
             <a:pPr lvl="1"/>
             <a:r>
-              <a:rPr lang="en-US" altLang="zh-CN"/>
-              <a:t>Second level</a:t>
+              <a:rPr lang="de-DE"/>
+              <a:t>Zweite Ebene</a:t>
             </a:r>
           </a:p>
           <a:p>
             <a:pPr lvl="2"/>
             <a:r>
-              <a:rPr lang="en-US" altLang="zh-CN"/>
-              <a:t>Third level</a:t>
+              <a:rPr lang="de-DE"/>
+              <a:t>Dritte Ebene</a:t>
             </a:r>
           </a:p>
           <a:p>
             <a:pPr lvl="3"/>
             <a:r>
-              <a:rPr lang="en-US" altLang="zh-CN"/>
-              <a:t>Fourth level</a:t>
+              <a:rPr lang="de-DE"/>
+              <a:t>Vierte Ebene</a:t>
             </a:r>
           </a:p>
           <a:p>
             <a:pPr lvl="4"/>
             <a:r>
-              <a:rPr lang="en-US" altLang="zh-CN"/>
-              <a:t>Fifth level</a:t>
-            </a:r>
-            <a:endParaRPr lang="zh-CN" altLang="en-US"/>
-          </a:p>
-        </p:txBody>
-      </p:sp>
-      <p:sp>
-        <p:nvSpPr>
-          <p:cNvPr id="4" name="Content Placeholder 3">
-            <a:extLst>
-              <a:ext uri="{FF2B5EF4-FFF2-40B4-BE49-F238E27FC236}">
-                <a16:creationId xmlns:a16="http://schemas.microsoft.com/office/drawing/2014/main" id="{9E6B598F-6AAD-48C7-92AC-700B6DBEC1C4}"/>
+              <a:rPr lang="de-DE"/>
+              <a:t>Fünfte Ebene</a:t>
+            </a:r>
+            <a:endParaRPr lang="en-US"/>
+          </a:p>
+        </p:txBody>
+      </p:sp>
+      <p:sp>
+        <p:nvSpPr>
+          <p:cNvPr id="4" name="Inhaltsplatzhalter 3">
+            <a:extLst>
+              <a:ext uri="{FF2B5EF4-FFF2-40B4-BE49-F238E27FC236}">
+                <a16:creationId xmlns:a16="http://schemas.microsoft.com/office/drawing/2014/main" id="{A94D8865-04BC-B84B-D17D-138BE8073FCD}"/>
               </a:ext>
             </a:extLst>
           </p:cNvPr>
@@ -1863,47 +2356,47 @@
           <a:p>
             <a:pPr lvl="0"/>
             <a:r>
-              <a:rPr lang="en-US" altLang="zh-CN"/>
-              <a:t>Click to edit Master text styles</a:t>
+              <a:rPr lang="de-DE"/>
+              <a:t>Mastertextformat bearbeiten</a:t>
             </a:r>
           </a:p>
           <a:p>
             <a:pPr lvl="1"/>
             <a:r>
-              <a:rPr lang="en-US" altLang="zh-CN"/>
-              <a:t>Second level</a:t>
+              <a:rPr lang="de-DE"/>
+              <a:t>Zweite Ebene</a:t>
             </a:r>
           </a:p>
           <a:p>
             <a:pPr lvl="2"/>
             <a:r>
-              <a:rPr lang="en-US" altLang="zh-CN"/>
-              <a:t>Third level</a:t>
+              <a:rPr lang="de-DE"/>
+              <a:t>Dritte Ebene</a:t>
             </a:r>
           </a:p>
           <a:p>
             <a:pPr lvl="3"/>
             <a:r>
-              <a:rPr lang="en-US" altLang="zh-CN"/>
-              <a:t>Fourth level</a:t>
+              <a:rPr lang="de-DE"/>
+              <a:t>Vierte Ebene</a:t>
             </a:r>
           </a:p>
           <a:p>
             <a:pPr lvl="4"/>
             <a:r>
-              <a:rPr lang="en-US" altLang="zh-CN"/>
-              <a:t>Fifth level</a:t>
-            </a:r>
-            <a:endParaRPr lang="zh-CN" altLang="en-US"/>
-          </a:p>
-        </p:txBody>
-      </p:sp>
-      <p:sp>
-        <p:nvSpPr>
-          <p:cNvPr id="5" name="Date Placeholder 4">
-            <a:extLst>
-              <a:ext uri="{FF2B5EF4-FFF2-40B4-BE49-F238E27FC236}">
-                <a16:creationId xmlns:a16="http://schemas.microsoft.com/office/drawing/2014/main" id="{B751EDC2-3017-418C-AC13-818B9C9B97FF}"/>
+              <a:rPr lang="de-DE"/>
+              <a:t>Fünfte Ebene</a:t>
+            </a:r>
+            <a:endParaRPr lang="en-US"/>
+          </a:p>
+        </p:txBody>
+      </p:sp>
+      <p:sp>
+        <p:nvSpPr>
+          <p:cNvPr id="5" name="Datumsplatzhalter 4">
+            <a:extLst>
+              <a:ext uri="{FF2B5EF4-FFF2-40B4-BE49-F238E27FC236}">
+                <a16:creationId xmlns:a16="http://schemas.microsoft.com/office/drawing/2014/main" id="{E1D1F958-739F-E721-FC4A-1FC1C030592D}"/>
               </a:ext>
             </a:extLst>
           </p:cNvPr>
@@ -1919,20 +2412,20 @@
           <a:bodyPr/>
           <a:lstStyle/>
           <a:p>
-            <a:fld id="{6F9AC78F-69F7-4DFA-9ED3-63209FEF1CF3}" type="datetimeFigureOut">
-              <a:rPr lang="zh-CN" altLang="en-US" smtClean="0"/>
-              <a:t>2020/6/22</a:t>
+            <a:fld id="{D3377326-B63D-4862-9B98-380EE10FA03E}" type="datetimeFigureOut">
+              <a:rPr lang="en-US" smtClean="0"/>
+              <a:t>7/12/2025</a:t>
             </a:fld>
-            <a:endParaRPr lang="zh-CN" altLang="en-US"/>
-          </a:p>
-        </p:txBody>
-      </p:sp>
-      <p:sp>
-        <p:nvSpPr>
-          <p:cNvPr id="6" name="Footer Placeholder 5">
-            <a:extLst>
-              <a:ext uri="{FF2B5EF4-FFF2-40B4-BE49-F238E27FC236}">
-                <a16:creationId xmlns:a16="http://schemas.microsoft.com/office/drawing/2014/main" id="{E7FB02BA-3729-4717-9104-1512704D2B85}"/>
+            <a:endParaRPr lang="en-US"/>
+          </a:p>
+        </p:txBody>
+      </p:sp>
+      <p:sp>
+        <p:nvSpPr>
+          <p:cNvPr id="6" name="Fußzeilenplatzhalter 5">
+            <a:extLst>
+              <a:ext uri="{FF2B5EF4-FFF2-40B4-BE49-F238E27FC236}">
+                <a16:creationId xmlns:a16="http://schemas.microsoft.com/office/drawing/2014/main" id="{C2043A55-DB6F-0ABE-FC5F-E3611165D4D9}"/>
               </a:ext>
             </a:extLst>
           </p:cNvPr>
@@ -1948,16 +2441,16 @@
           <a:bodyPr/>
           <a:lstStyle/>
           <a:p>
-            <a:endParaRPr lang="zh-CN" altLang="en-US"/>
-          </a:p>
-        </p:txBody>
-      </p:sp>
-      <p:sp>
-        <p:nvSpPr>
-          <p:cNvPr id="7" name="Slide Number Placeholder 6">
-            <a:extLst>
-              <a:ext uri="{FF2B5EF4-FFF2-40B4-BE49-F238E27FC236}">
-                <a16:creationId xmlns:a16="http://schemas.microsoft.com/office/drawing/2014/main" id="{055864EA-54A4-4395-AB02-820308A28D5F}"/>
+            <a:endParaRPr lang="en-US"/>
+          </a:p>
+        </p:txBody>
+      </p:sp>
+      <p:sp>
+        <p:nvSpPr>
+          <p:cNvPr id="7" name="Foliennummernplatzhalter 6">
+            <a:extLst>
+              <a:ext uri="{FF2B5EF4-FFF2-40B4-BE49-F238E27FC236}">
+                <a16:creationId xmlns:a16="http://schemas.microsoft.com/office/drawing/2014/main" id="{1F1F35A0-4D87-B0DD-E50E-4F23C9885F45}"/>
               </a:ext>
             </a:extLst>
           </p:cNvPr>
@@ -1973,18 +2466,18 @@
           <a:bodyPr/>
           <a:lstStyle/>
           <a:p>
-            <a:fld id="{50E98428-D87D-43E4-BBCA-B5FD8296FA72}" type="slidenum">
-              <a:rPr lang="zh-CN" altLang="en-US" smtClean="0"/>
-              <a:t>‹#›</a:t>
+            <a:fld id="{7A215391-53CE-46CA-B8DB-791AAC6E5119}" type="slidenum">
+              <a:rPr lang="en-US" smtClean="0"/>
+              <a:t>‹Nr.›</a:t>
             </a:fld>
-            <a:endParaRPr lang="zh-CN" altLang="en-US"/>
+            <a:endParaRPr lang="en-US"/>
           </a:p>
         </p:txBody>
       </p:sp>
     </p:spTree>
     <p:extLst>
       <p:ext uri="{BB962C8B-B14F-4D97-AF65-F5344CB8AC3E}">
-        <p14:creationId xmlns:p14="http://schemas.microsoft.com/office/powerpoint/2010/main" val="3117480875"/>
+        <p14:creationId xmlns:p14="http://schemas.microsoft.com/office/powerpoint/2010/main" val="2420874037"/>
       </p:ext>
     </p:extLst>
   </p:cSld>
@@ -1996,7 +2489,7 @@
 
 <file path=ppt/slideLayouts/slideLayout5.xml><?xml version="1.0" encoding="utf-8"?>
 <p:sldLayout xmlns:a="http://schemas.openxmlformats.org/drawingml/2006/main" xmlns:r="http://schemas.openxmlformats.org/officeDocument/2006/relationships" xmlns:p="http://schemas.openxmlformats.org/presentationml/2006/main" type="twoTxTwoObj" preserve="1">
-  <p:cSld name="Comparison">
+  <p:cSld name="Vergleich">
     <p:spTree>
       <p:nvGrpSpPr>
         <p:cNvPr id="1" name=""/>
@@ -2013,10 +2506,10 @@
       </p:grpSpPr>
       <p:sp>
         <p:nvSpPr>
-          <p:cNvPr id="2" name="Title 1">
-            <a:extLst>
-              <a:ext uri="{FF2B5EF4-FFF2-40B4-BE49-F238E27FC236}">
-                <a16:creationId xmlns:a16="http://schemas.microsoft.com/office/drawing/2014/main" id="{2E8EE334-E403-4B25-AF63-9A577EB79641}"/>
+          <p:cNvPr id="2" name="Titel 1">
+            <a:extLst>
+              <a:ext uri="{FF2B5EF4-FFF2-40B4-BE49-F238E27FC236}">
+                <a16:creationId xmlns:a16="http://schemas.microsoft.com/office/drawing/2014/main" id="{EAA10B23-0314-A109-4EED-4713467A03FF}"/>
               </a:ext>
             </a:extLst>
           </p:cNvPr>
@@ -2038,19 +2531,19 @@
           <a:lstStyle/>
           <a:p>
             <a:r>
-              <a:rPr lang="en-US" altLang="zh-CN"/>
-              <a:t>Click to edit Master title style</a:t>
-            </a:r>
-            <a:endParaRPr lang="zh-CN" altLang="en-US"/>
-          </a:p>
-        </p:txBody>
-      </p:sp>
-      <p:sp>
-        <p:nvSpPr>
-          <p:cNvPr id="3" name="Text Placeholder 2">
-            <a:extLst>
-              <a:ext uri="{FF2B5EF4-FFF2-40B4-BE49-F238E27FC236}">
-                <a16:creationId xmlns:a16="http://schemas.microsoft.com/office/drawing/2014/main" id="{98631EA6-C54B-4088-9A2F-190FEAF13978}"/>
+              <a:rPr lang="de-DE"/>
+              <a:t>Mastertitelformat bearbeiten</a:t>
+            </a:r>
+            <a:endParaRPr lang="en-US"/>
+          </a:p>
+        </p:txBody>
+      </p:sp>
+      <p:sp>
+        <p:nvSpPr>
+          <p:cNvPr id="3" name="Textplatzhalter 2">
+            <a:extLst>
+              <a:ext uri="{FF2B5EF4-FFF2-40B4-BE49-F238E27FC236}">
+                <a16:creationId xmlns:a16="http://schemas.microsoft.com/office/drawing/2014/main" id="{5614F3D6-3D12-B0C6-1C63-6205A8E47403}"/>
               </a:ext>
             </a:extLst>
           </p:cNvPr>
@@ -2110,18 +2603,18 @@
           <a:p>
             <a:pPr lvl="0"/>
             <a:r>
-              <a:rPr lang="en-US" altLang="zh-CN"/>
-              <a:t>Click to edit Master text styles</a:t>
-            </a:r>
-          </a:p>
-        </p:txBody>
-      </p:sp>
-      <p:sp>
-        <p:nvSpPr>
-          <p:cNvPr id="4" name="Content Placeholder 3">
-            <a:extLst>
-              <a:ext uri="{FF2B5EF4-FFF2-40B4-BE49-F238E27FC236}">
-                <a16:creationId xmlns:a16="http://schemas.microsoft.com/office/drawing/2014/main" id="{BE6D0999-2B7A-4E1B-A358-15D7DA50301E}"/>
+              <a:rPr lang="de-DE"/>
+              <a:t>Mastertextformat bearbeiten</a:t>
+            </a:r>
+          </a:p>
+        </p:txBody>
+      </p:sp>
+      <p:sp>
+        <p:nvSpPr>
+          <p:cNvPr id="4" name="Inhaltsplatzhalter 3">
+            <a:extLst>
+              <a:ext uri="{FF2B5EF4-FFF2-40B4-BE49-F238E27FC236}">
+                <a16:creationId xmlns:a16="http://schemas.microsoft.com/office/drawing/2014/main" id="{2D48493B-4494-85F5-E9A9-D3B20841FD7A}"/>
               </a:ext>
             </a:extLst>
           </p:cNvPr>
@@ -2144,47 +2637,47 @@
           <a:p>
             <a:pPr lvl="0"/>
             <a:r>
-              <a:rPr lang="en-US" altLang="zh-CN"/>
-              <a:t>Click to edit Master text styles</a:t>
+              <a:rPr lang="de-DE"/>
+              <a:t>Mastertextformat bearbeiten</a:t>
             </a:r>
           </a:p>
           <a:p>
             <a:pPr lvl="1"/>
             <a:r>
-              <a:rPr lang="en-US" altLang="zh-CN"/>
-              <a:t>Second level</a:t>
+              <a:rPr lang="de-DE"/>
+              <a:t>Zweite Ebene</a:t>
             </a:r>
           </a:p>
           <a:p>
             <a:pPr lvl="2"/>
             <a:r>
-              <a:rPr lang="en-US" altLang="zh-CN"/>
-              <a:t>Third level</a:t>
+              <a:rPr lang="de-DE"/>
+              <a:t>Dritte Ebene</a:t>
             </a:r>
           </a:p>
           <a:p>
             <a:pPr lvl="3"/>
             <a:r>
-              <a:rPr lang="en-US" altLang="zh-CN"/>
-              <a:t>Fourth level</a:t>
+              <a:rPr lang="de-DE"/>
+              <a:t>Vierte Ebene</a:t>
             </a:r>
           </a:p>
           <a:p>
             <a:pPr lvl="4"/>
             <a:r>
-              <a:rPr lang="en-US" altLang="zh-CN"/>
-              <a:t>Fifth level</a:t>
-            </a:r>
-            <a:endParaRPr lang="zh-CN" altLang="en-US"/>
-          </a:p>
-        </p:txBody>
-      </p:sp>
-      <p:sp>
-        <p:nvSpPr>
-          <p:cNvPr id="5" name="Text Placeholder 4">
-            <a:extLst>
-              <a:ext uri="{FF2B5EF4-FFF2-40B4-BE49-F238E27FC236}">
-                <a16:creationId xmlns:a16="http://schemas.microsoft.com/office/drawing/2014/main" id="{12E6BFFE-1B56-4226-B35A-F29A676AF334}"/>
+              <a:rPr lang="de-DE"/>
+              <a:t>Fünfte Ebene</a:t>
+            </a:r>
+            <a:endParaRPr lang="en-US"/>
+          </a:p>
+        </p:txBody>
+      </p:sp>
+      <p:sp>
+        <p:nvSpPr>
+          <p:cNvPr id="5" name="Textplatzhalter 4">
+            <a:extLst>
+              <a:ext uri="{FF2B5EF4-FFF2-40B4-BE49-F238E27FC236}">
+                <a16:creationId xmlns:a16="http://schemas.microsoft.com/office/drawing/2014/main" id="{91CD3D7F-AA7B-9499-8DFB-8560BA7687AC}"/>
               </a:ext>
             </a:extLst>
           </p:cNvPr>
@@ -2244,18 +2737,18 @@
           <a:p>
             <a:pPr lvl="0"/>
             <a:r>
-              <a:rPr lang="en-US" altLang="zh-CN"/>
-              <a:t>Click to edit Master text styles</a:t>
-            </a:r>
-          </a:p>
-        </p:txBody>
-      </p:sp>
-      <p:sp>
-        <p:nvSpPr>
-          <p:cNvPr id="6" name="Content Placeholder 5">
-            <a:extLst>
-              <a:ext uri="{FF2B5EF4-FFF2-40B4-BE49-F238E27FC236}">
-                <a16:creationId xmlns:a16="http://schemas.microsoft.com/office/drawing/2014/main" id="{A5FFB109-492D-4D55-8A14-262501093E19}"/>
+              <a:rPr lang="de-DE"/>
+              <a:t>Mastertextformat bearbeiten</a:t>
+            </a:r>
+          </a:p>
+        </p:txBody>
+      </p:sp>
+      <p:sp>
+        <p:nvSpPr>
+          <p:cNvPr id="6" name="Inhaltsplatzhalter 5">
+            <a:extLst>
+              <a:ext uri="{FF2B5EF4-FFF2-40B4-BE49-F238E27FC236}">
+                <a16:creationId xmlns:a16="http://schemas.microsoft.com/office/drawing/2014/main" id="{14CA3871-5BEA-D63B-125C-F2C72DBCC27D}"/>
               </a:ext>
             </a:extLst>
           </p:cNvPr>
@@ -2278,47 +2771,47 @@
           <a:p>
             <a:pPr lvl="0"/>
             <a:r>
-              <a:rPr lang="en-US" altLang="zh-CN"/>
-              <a:t>Click to edit Master text styles</a:t>
+              <a:rPr lang="de-DE"/>
+              <a:t>Mastertextformat bearbeiten</a:t>
             </a:r>
           </a:p>
           <a:p>
             <a:pPr lvl="1"/>
             <a:r>
-              <a:rPr lang="en-US" altLang="zh-CN"/>
-              <a:t>Second level</a:t>
+              <a:rPr lang="de-DE"/>
+              <a:t>Zweite Ebene</a:t>
             </a:r>
           </a:p>
           <a:p>
             <a:pPr lvl="2"/>
             <a:r>
-              <a:rPr lang="en-US" altLang="zh-CN"/>
-              <a:t>Third level</a:t>
+              <a:rPr lang="de-DE"/>
+              <a:t>Dritte Ebene</a:t>
             </a:r>
           </a:p>
           <a:p>
             <a:pPr lvl="3"/>
             <a:r>
-              <a:rPr lang="en-US" altLang="zh-CN"/>
-              <a:t>Fourth level</a:t>
+              <a:rPr lang="de-DE"/>
+              <a:t>Vierte Ebene</a:t>
             </a:r>
           </a:p>
           <a:p>
             <a:pPr lvl="4"/>
             <a:r>
-              <a:rPr lang="en-US" altLang="zh-CN"/>
-              <a:t>Fifth level</a:t>
-            </a:r>
-            <a:endParaRPr lang="zh-CN" altLang="en-US"/>
-          </a:p>
-        </p:txBody>
-      </p:sp>
-      <p:sp>
-        <p:nvSpPr>
-          <p:cNvPr id="7" name="Date Placeholder 6">
-            <a:extLst>
-              <a:ext uri="{FF2B5EF4-FFF2-40B4-BE49-F238E27FC236}">
-                <a16:creationId xmlns:a16="http://schemas.microsoft.com/office/drawing/2014/main" id="{D3F3F101-ABCE-462F-B05E-7A4F3361A872}"/>
+              <a:rPr lang="de-DE"/>
+              <a:t>Fünfte Ebene</a:t>
+            </a:r>
+            <a:endParaRPr lang="en-US"/>
+          </a:p>
+        </p:txBody>
+      </p:sp>
+      <p:sp>
+        <p:nvSpPr>
+          <p:cNvPr id="7" name="Datumsplatzhalter 6">
+            <a:extLst>
+              <a:ext uri="{FF2B5EF4-FFF2-40B4-BE49-F238E27FC236}">
+                <a16:creationId xmlns:a16="http://schemas.microsoft.com/office/drawing/2014/main" id="{7951779E-C740-0995-0FFD-17FB659A4EAF}"/>
               </a:ext>
             </a:extLst>
           </p:cNvPr>
@@ -2334,20 +2827,20 @@
           <a:bodyPr/>
           <a:lstStyle/>
           <a:p>
-            <a:fld id="{6F9AC78F-69F7-4DFA-9ED3-63209FEF1CF3}" type="datetimeFigureOut">
-              <a:rPr lang="zh-CN" altLang="en-US" smtClean="0"/>
-              <a:t>2020/6/22</a:t>
+            <a:fld id="{D3377326-B63D-4862-9B98-380EE10FA03E}" type="datetimeFigureOut">
+              <a:rPr lang="en-US" smtClean="0"/>
+              <a:t>7/12/2025</a:t>
             </a:fld>
-            <a:endParaRPr lang="zh-CN" altLang="en-US"/>
-          </a:p>
-        </p:txBody>
-      </p:sp>
-      <p:sp>
-        <p:nvSpPr>
-          <p:cNvPr id="8" name="Footer Placeholder 7">
-            <a:extLst>
-              <a:ext uri="{FF2B5EF4-FFF2-40B4-BE49-F238E27FC236}">
-                <a16:creationId xmlns:a16="http://schemas.microsoft.com/office/drawing/2014/main" id="{176F14FC-6C81-42B3-B112-F40245E9DCEA}"/>
+            <a:endParaRPr lang="en-US"/>
+          </a:p>
+        </p:txBody>
+      </p:sp>
+      <p:sp>
+        <p:nvSpPr>
+          <p:cNvPr id="8" name="Fußzeilenplatzhalter 7">
+            <a:extLst>
+              <a:ext uri="{FF2B5EF4-FFF2-40B4-BE49-F238E27FC236}">
+                <a16:creationId xmlns:a16="http://schemas.microsoft.com/office/drawing/2014/main" id="{628D5B34-A968-1766-AC14-BF6D4E4A79B1}"/>
               </a:ext>
             </a:extLst>
           </p:cNvPr>
@@ -2363,16 +2856,16 @@
           <a:bodyPr/>
           <a:lstStyle/>
           <a:p>
-            <a:endParaRPr lang="zh-CN" altLang="en-US"/>
-          </a:p>
-        </p:txBody>
-      </p:sp>
-      <p:sp>
-        <p:nvSpPr>
-          <p:cNvPr id="9" name="Slide Number Placeholder 8">
-            <a:extLst>
-              <a:ext uri="{FF2B5EF4-FFF2-40B4-BE49-F238E27FC236}">
-                <a16:creationId xmlns:a16="http://schemas.microsoft.com/office/drawing/2014/main" id="{94889494-2C7C-4D02-9968-1966A9F666E3}"/>
+            <a:endParaRPr lang="en-US"/>
+          </a:p>
+        </p:txBody>
+      </p:sp>
+      <p:sp>
+        <p:nvSpPr>
+          <p:cNvPr id="9" name="Foliennummernplatzhalter 8">
+            <a:extLst>
+              <a:ext uri="{FF2B5EF4-FFF2-40B4-BE49-F238E27FC236}">
+                <a16:creationId xmlns:a16="http://schemas.microsoft.com/office/drawing/2014/main" id="{920D48FC-8F7F-ECB1-BC94-BBE507048CBD}"/>
               </a:ext>
             </a:extLst>
           </p:cNvPr>
@@ -2388,18 +2881,18 @@
           <a:bodyPr/>
           <a:lstStyle/>
           <a:p>
-            <a:fld id="{50E98428-D87D-43E4-BBCA-B5FD8296FA72}" type="slidenum">
-              <a:rPr lang="zh-CN" altLang="en-US" smtClean="0"/>
-              <a:t>‹#›</a:t>
+            <a:fld id="{7A215391-53CE-46CA-B8DB-791AAC6E5119}" type="slidenum">
+              <a:rPr lang="en-US" smtClean="0"/>
+              <a:t>‹Nr.›</a:t>
             </a:fld>
-            <a:endParaRPr lang="zh-CN" altLang="en-US"/>
+            <a:endParaRPr lang="en-US"/>
           </a:p>
         </p:txBody>
       </p:sp>
     </p:spTree>
     <p:extLst>
       <p:ext uri="{BB962C8B-B14F-4D97-AF65-F5344CB8AC3E}">
-        <p14:creationId xmlns:p14="http://schemas.microsoft.com/office/powerpoint/2010/main" val="2722882721"/>
+        <p14:creationId xmlns:p14="http://schemas.microsoft.com/office/powerpoint/2010/main" val="2781760288"/>
       </p:ext>
     </p:extLst>
   </p:cSld>
@@ -2411,7 +2904,7 @@
 
 <file path=ppt/slideLayouts/slideLayout6.xml><?xml version="1.0" encoding="utf-8"?>
 <p:sldLayout xmlns:a="http://schemas.openxmlformats.org/drawingml/2006/main" xmlns:r="http://schemas.openxmlformats.org/officeDocument/2006/relationships" xmlns:p="http://schemas.openxmlformats.org/presentationml/2006/main" type="titleOnly" preserve="1">
-  <p:cSld name="Title Only">
+  <p:cSld name="Nur Titel">
     <p:spTree>
       <p:nvGrpSpPr>
         <p:cNvPr id="1" name=""/>
@@ -2428,10 +2921,10 @@
       </p:grpSpPr>
       <p:sp>
         <p:nvSpPr>
-          <p:cNvPr id="2" name="Title 1">
-            <a:extLst>
-              <a:ext uri="{FF2B5EF4-FFF2-40B4-BE49-F238E27FC236}">
-                <a16:creationId xmlns:a16="http://schemas.microsoft.com/office/drawing/2014/main" id="{2D2C1FBD-81D2-4A7B-8D8D-D861C1BC66D0}"/>
+          <p:cNvPr id="2" name="Titel 1">
+            <a:extLst>
+              <a:ext uri="{FF2B5EF4-FFF2-40B4-BE49-F238E27FC236}">
+                <a16:creationId xmlns:a16="http://schemas.microsoft.com/office/drawing/2014/main" id="{AA68DD45-E79C-EB93-529C-A98B8258FDC3}"/>
               </a:ext>
             </a:extLst>
           </p:cNvPr>
@@ -2448,19 +2941,19 @@
           <a:lstStyle/>
           <a:p>
             <a:r>
-              <a:rPr lang="en-US" altLang="zh-CN"/>
-              <a:t>Click to edit Master title style</a:t>
-            </a:r>
-            <a:endParaRPr lang="zh-CN" altLang="en-US"/>
-          </a:p>
-        </p:txBody>
-      </p:sp>
-      <p:sp>
-        <p:nvSpPr>
-          <p:cNvPr id="3" name="Date Placeholder 2">
-            <a:extLst>
-              <a:ext uri="{FF2B5EF4-FFF2-40B4-BE49-F238E27FC236}">
-                <a16:creationId xmlns:a16="http://schemas.microsoft.com/office/drawing/2014/main" id="{ED4B565E-E934-44D6-836B-5BB89376199D}"/>
+              <a:rPr lang="de-DE"/>
+              <a:t>Mastertitelformat bearbeiten</a:t>
+            </a:r>
+            <a:endParaRPr lang="en-US"/>
+          </a:p>
+        </p:txBody>
+      </p:sp>
+      <p:sp>
+        <p:nvSpPr>
+          <p:cNvPr id="3" name="Datumsplatzhalter 2">
+            <a:extLst>
+              <a:ext uri="{FF2B5EF4-FFF2-40B4-BE49-F238E27FC236}">
+                <a16:creationId xmlns:a16="http://schemas.microsoft.com/office/drawing/2014/main" id="{E58C0F44-ECAF-54A3-EE86-5AED76E2F03D}"/>
               </a:ext>
             </a:extLst>
           </p:cNvPr>
@@ -2476,20 +2969,20 @@
           <a:bodyPr/>
           <a:lstStyle/>
           <a:p>
-            <a:fld id="{6F9AC78F-69F7-4DFA-9ED3-63209FEF1CF3}" type="datetimeFigureOut">
-              <a:rPr lang="zh-CN" altLang="en-US" smtClean="0"/>
-              <a:t>2020/6/22</a:t>
+            <a:fld id="{D3377326-B63D-4862-9B98-380EE10FA03E}" type="datetimeFigureOut">
+              <a:rPr lang="en-US" smtClean="0"/>
+              <a:t>7/12/2025</a:t>
             </a:fld>
-            <a:endParaRPr lang="zh-CN" altLang="en-US"/>
-          </a:p>
-        </p:txBody>
-      </p:sp>
-      <p:sp>
-        <p:nvSpPr>
-          <p:cNvPr id="4" name="Footer Placeholder 3">
-            <a:extLst>
-              <a:ext uri="{FF2B5EF4-FFF2-40B4-BE49-F238E27FC236}">
-                <a16:creationId xmlns:a16="http://schemas.microsoft.com/office/drawing/2014/main" id="{70506D1F-D3F9-4952-8117-824A8E586835}"/>
+            <a:endParaRPr lang="en-US"/>
+          </a:p>
+        </p:txBody>
+      </p:sp>
+      <p:sp>
+        <p:nvSpPr>
+          <p:cNvPr id="4" name="Fußzeilenplatzhalter 3">
+            <a:extLst>
+              <a:ext uri="{FF2B5EF4-FFF2-40B4-BE49-F238E27FC236}">
+                <a16:creationId xmlns:a16="http://schemas.microsoft.com/office/drawing/2014/main" id="{489BE13F-1966-C903-C703-7568380D635D}"/>
               </a:ext>
             </a:extLst>
           </p:cNvPr>
@@ -2505,16 +2998,16 @@
           <a:bodyPr/>
           <a:lstStyle/>
           <a:p>
-            <a:endParaRPr lang="zh-CN" altLang="en-US"/>
-          </a:p>
-        </p:txBody>
-      </p:sp>
-      <p:sp>
-        <p:nvSpPr>
-          <p:cNvPr id="5" name="Slide Number Placeholder 4">
-            <a:extLst>
-              <a:ext uri="{FF2B5EF4-FFF2-40B4-BE49-F238E27FC236}">
-                <a16:creationId xmlns:a16="http://schemas.microsoft.com/office/drawing/2014/main" id="{14564C1A-92BB-4D0C-9F20-0C53262886C3}"/>
+            <a:endParaRPr lang="en-US"/>
+          </a:p>
+        </p:txBody>
+      </p:sp>
+      <p:sp>
+        <p:nvSpPr>
+          <p:cNvPr id="5" name="Foliennummernplatzhalter 4">
+            <a:extLst>
+              <a:ext uri="{FF2B5EF4-FFF2-40B4-BE49-F238E27FC236}">
+                <a16:creationId xmlns:a16="http://schemas.microsoft.com/office/drawing/2014/main" id="{D6BFDCE2-FBE5-C5E5-4284-F906B1572067}"/>
               </a:ext>
             </a:extLst>
           </p:cNvPr>
@@ -2530,18 +3023,18 @@
           <a:bodyPr/>
           <a:lstStyle/>
           <a:p>
-            <a:fld id="{50E98428-D87D-43E4-BBCA-B5FD8296FA72}" type="slidenum">
-              <a:rPr lang="zh-CN" altLang="en-US" smtClean="0"/>
-              <a:t>‹#›</a:t>
+            <a:fld id="{7A215391-53CE-46CA-B8DB-791AAC6E5119}" type="slidenum">
+              <a:rPr lang="en-US" smtClean="0"/>
+              <a:t>‹Nr.›</a:t>
             </a:fld>
-            <a:endParaRPr lang="zh-CN" altLang="en-US"/>
+            <a:endParaRPr lang="en-US"/>
           </a:p>
         </p:txBody>
       </p:sp>
     </p:spTree>
     <p:extLst>
       <p:ext uri="{BB962C8B-B14F-4D97-AF65-F5344CB8AC3E}">
-        <p14:creationId xmlns:p14="http://schemas.microsoft.com/office/powerpoint/2010/main" val="2420462438"/>
+        <p14:creationId xmlns:p14="http://schemas.microsoft.com/office/powerpoint/2010/main" val="2508964085"/>
       </p:ext>
     </p:extLst>
   </p:cSld>
@@ -2553,7 +3046,7 @@
 
 <file path=ppt/slideLayouts/slideLayout7.xml><?xml version="1.0" encoding="utf-8"?>
 <p:sldLayout xmlns:a="http://schemas.openxmlformats.org/drawingml/2006/main" xmlns:r="http://schemas.openxmlformats.org/officeDocument/2006/relationships" xmlns:p="http://schemas.openxmlformats.org/presentationml/2006/main" type="blank" preserve="1">
-  <p:cSld name="Blank">
+  <p:cSld name="Leer">
     <p:spTree>
       <p:nvGrpSpPr>
         <p:cNvPr id="1" name=""/>
@@ -2570,10 +3063,10 @@
       </p:grpSpPr>
       <p:sp>
         <p:nvSpPr>
-          <p:cNvPr id="2" name="Date Placeholder 1">
-            <a:extLst>
-              <a:ext uri="{FF2B5EF4-FFF2-40B4-BE49-F238E27FC236}">
-                <a16:creationId xmlns:a16="http://schemas.microsoft.com/office/drawing/2014/main" id="{21B2EFE9-A99F-4A0C-9DE6-5FAE0AD2AADD}"/>
+          <p:cNvPr id="2" name="Datumsplatzhalter 1">
+            <a:extLst>
+              <a:ext uri="{FF2B5EF4-FFF2-40B4-BE49-F238E27FC236}">
+                <a16:creationId xmlns:a16="http://schemas.microsoft.com/office/drawing/2014/main" id="{F0E9F462-B278-5844-EBF6-E18E6AF295A8}"/>
               </a:ext>
             </a:extLst>
           </p:cNvPr>
@@ -2589,20 +3082,20 @@
           <a:bodyPr/>
           <a:lstStyle/>
           <a:p>
-            <a:fld id="{6F9AC78F-69F7-4DFA-9ED3-63209FEF1CF3}" type="datetimeFigureOut">
-              <a:rPr lang="zh-CN" altLang="en-US" smtClean="0"/>
-              <a:t>2020/6/22</a:t>
+            <a:fld id="{D3377326-B63D-4862-9B98-380EE10FA03E}" type="datetimeFigureOut">
+              <a:rPr lang="en-US" smtClean="0"/>
+              <a:t>7/12/2025</a:t>
             </a:fld>
-            <a:endParaRPr lang="zh-CN" altLang="en-US"/>
-          </a:p>
-        </p:txBody>
-      </p:sp>
-      <p:sp>
-        <p:nvSpPr>
-          <p:cNvPr id="3" name="Footer Placeholder 2">
-            <a:extLst>
-              <a:ext uri="{FF2B5EF4-FFF2-40B4-BE49-F238E27FC236}">
-                <a16:creationId xmlns:a16="http://schemas.microsoft.com/office/drawing/2014/main" id="{94D0921A-BB69-40D8-B494-9CE4272C9C18}"/>
+            <a:endParaRPr lang="en-US"/>
+          </a:p>
+        </p:txBody>
+      </p:sp>
+      <p:sp>
+        <p:nvSpPr>
+          <p:cNvPr id="3" name="Fußzeilenplatzhalter 2">
+            <a:extLst>
+              <a:ext uri="{FF2B5EF4-FFF2-40B4-BE49-F238E27FC236}">
+                <a16:creationId xmlns:a16="http://schemas.microsoft.com/office/drawing/2014/main" id="{B6BCBF52-F8EC-B731-FE06-BC66E7B0989E}"/>
               </a:ext>
             </a:extLst>
           </p:cNvPr>
@@ -2618,16 +3111,16 @@
           <a:bodyPr/>
           <a:lstStyle/>
           <a:p>
-            <a:endParaRPr lang="zh-CN" altLang="en-US"/>
-          </a:p>
-        </p:txBody>
-      </p:sp>
-      <p:sp>
-        <p:nvSpPr>
-          <p:cNvPr id="4" name="Slide Number Placeholder 3">
-            <a:extLst>
-              <a:ext uri="{FF2B5EF4-FFF2-40B4-BE49-F238E27FC236}">
-                <a16:creationId xmlns:a16="http://schemas.microsoft.com/office/drawing/2014/main" id="{465C7BB5-FF73-4431-82EA-1E14ED6BB5BC}"/>
+            <a:endParaRPr lang="en-US"/>
+          </a:p>
+        </p:txBody>
+      </p:sp>
+      <p:sp>
+        <p:nvSpPr>
+          <p:cNvPr id="4" name="Foliennummernplatzhalter 3">
+            <a:extLst>
+              <a:ext uri="{FF2B5EF4-FFF2-40B4-BE49-F238E27FC236}">
+                <a16:creationId xmlns:a16="http://schemas.microsoft.com/office/drawing/2014/main" id="{FECDF182-C5DA-C9E0-A1D5-6D0ABC995B47}"/>
               </a:ext>
             </a:extLst>
           </p:cNvPr>
@@ -2643,18 +3136,18 @@
           <a:bodyPr/>
           <a:lstStyle/>
           <a:p>
-            <a:fld id="{50E98428-D87D-43E4-BBCA-B5FD8296FA72}" type="slidenum">
-              <a:rPr lang="zh-CN" altLang="en-US" smtClean="0"/>
-              <a:t>‹#›</a:t>
+            <a:fld id="{7A215391-53CE-46CA-B8DB-791AAC6E5119}" type="slidenum">
+              <a:rPr lang="en-US" smtClean="0"/>
+              <a:t>‹Nr.›</a:t>
             </a:fld>
-            <a:endParaRPr lang="zh-CN" altLang="en-US"/>
+            <a:endParaRPr lang="en-US"/>
           </a:p>
         </p:txBody>
       </p:sp>
     </p:spTree>
     <p:extLst>
       <p:ext uri="{BB962C8B-B14F-4D97-AF65-F5344CB8AC3E}">
-        <p14:creationId xmlns:p14="http://schemas.microsoft.com/office/powerpoint/2010/main" val="226758438"/>
+        <p14:creationId xmlns:p14="http://schemas.microsoft.com/office/powerpoint/2010/main" val="798946876"/>
       </p:ext>
     </p:extLst>
   </p:cSld>
@@ -2666,7 +3159,7 @@
 
 <file path=ppt/slideLayouts/slideLayout8.xml><?xml version="1.0" encoding="utf-8"?>
 <p:sldLayout xmlns:a="http://schemas.openxmlformats.org/drawingml/2006/main" xmlns:r="http://schemas.openxmlformats.org/officeDocument/2006/relationships" xmlns:p="http://schemas.openxmlformats.org/presentationml/2006/main" type="objTx" preserve="1">
-  <p:cSld name="Content with Caption">
+  <p:cSld name="Inhalt mit Überschrift">
     <p:spTree>
       <p:nvGrpSpPr>
         <p:cNvPr id="1" name=""/>
@@ -2683,10 +3176,10 @@
       </p:grpSpPr>
       <p:sp>
         <p:nvSpPr>
-          <p:cNvPr id="2" name="Title 1">
-            <a:extLst>
-              <a:ext uri="{FF2B5EF4-FFF2-40B4-BE49-F238E27FC236}">
-                <a16:creationId xmlns:a16="http://schemas.microsoft.com/office/drawing/2014/main" id="{7DDE430E-AE63-4A85-A029-B8BF397BB17A}"/>
+          <p:cNvPr id="2" name="Titel 1">
+            <a:extLst>
+              <a:ext uri="{FF2B5EF4-FFF2-40B4-BE49-F238E27FC236}">
+                <a16:creationId xmlns:a16="http://schemas.microsoft.com/office/drawing/2014/main" id="{D4E12CFC-AD1E-BC35-5283-46157D6886D9}"/>
               </a:ext>
             </a:extLst>
           </p:cNvPr>
@@ -2712,19 +3205,19 @@
           </a:lstStyle>
           <a:p>
             <a:r>
-              <a:rPr lang="en-US" altLang="zh-CN"/>
-              <a:t>Click to edit Master title style</a:t>
-            </a:r>
-            <a:endParaRPr lang="zh-CN" altLang="en-US"/>
-          </a:p>
-        </p:txBody>
-      </p:sp>
-      <p:sp>
-        <p:nvSpPr>
-          <p:cNvPr id="3" name="Content Placeholder 2">
-            <a:extLst>
-              <a:ext uri="{FF2B5EF4-FFF2-40B4-BE49-F238E27FC236}">
-                <a16:creationId xmlns:a16="http://schemas.microsoft.com/office/drawing/2014/main" id="{F26D611E-1FD3-4FE1-B0F2-D37F53160AB4}"/>
+              <a:rPr lang="de-DE"/>
+              <a:t>Mastertitelformat bearbeiten</a:t>
+            </a:r>
+            <a:endParaRPr lang="en-US"/>
+          </a:p>
+        </p:txBody>
+      </p:sp>
+      <p:sp>
+        <p:nvSpPr>
+          <p:cNvPr id="3" name="Inhaltsplatzhalter 2">
+            <a:extLst>
+              <a:ext uri="{FF2B5EF4-FFF2-40B4-BE49-F238E27FC236}">
+                <a16:creationId xmlns:a16="http://schemas.microsoft.com/office/drawing/2014/main" id="{CA48DE68-FCC2-6276-C4E3-1E4B6D83E387}"/>
               </a:ext>
             </a:extLst>
           </p:cNvPr>
@@ -2775,47 +3268,47 @@
           <a:p>
             <a:pPr lvl="0"/>
             <a:r>
-              <a:rPr lang="en-US" altLang="zh-CN"/>
-              <a:t>Click to edit Master text styles</a:t>
+              <a:rPr lang="de-DE"/>
+              <a:t>Mastertextformat bearbeiten</a:t>
             </a:r>
           </a:p>
           <a:p>
             <a:pPr lvl="1"/>
             <a:r>
-              <a:rPr lang="en-US" altLang="zh-CN"/>
-              <a:t>Second level</a:t>
+              <a:rPr lang="de-DE"/>
+              <a:t>Zweite Ebene</a:t>
             </a:r>
           </a:p>
           <a:p>
             <a:pPr lvl="2"/>
             <a:r>
-              <a:rPr lang="en-US" altLang="zh-CN"/>
-              <a:t>Third level</a:t>
+              <a:rPr lang="de-DE"/>
+              <a:t>Dritte Ebene</a:t>
             </a:r>
           </a:p>
           <a:p>
             <a:pPr lvl="3"/>
             <a:r>
-              <a:rPr lang="en-US" altLang="zh-CN"/>
-              <a:t>Fourth level</a:t>
+              <a:rPr lang="de-DE"/>
+              <a:t>Vierte Ebene</a:t>
             </a:r>
           </a:p>
           <a:p>
             <a:pPr lvl="4"/>
             <a:r>
-              <a:rPr lang="en-US" altLang="zh-CN"/>
-              <a:t>Fifth level</a:t>
-            </a:r>
-            <a:endParaRPr lang="zh-CN" altLang="en-US"/>
-          </a:p>
-        </p:txBody>
-      </p:sp>
-      <p:sp>
-        <p:nvSpPr>
-          <p:cNvPr id="4" name="Text Placeholder 3">
-            <a:extLst>
-              <a:ext uri="{FF2B5EF4-FFF2-40B4-BE49-F238E27FC236}">
-                <a16:creationId xmlns:a16="http://schemas.microsoft.com/office/drawing/2014/main" id="{099CA9EA-1858-4EE5-BA43-A7DA41EBC698}"/>
+              <a:rPr lang="de-DE"/>
+              <a:t>Fünfte Ebene</a:t>
+            </a:r>
+            <a:endParaRPr lang="en-US"/>
+          </a:p>
+        </p:txBody>
+      </p:sp>
+      <p:sp>
+        <p:nvSpPr>
+          <p:cNvPr id="4" name="Textplatzhalter 3">
+            <a:extLst>
+              <a:ext uri="{FF2B5EF4-FFF2-40B4-BE49-F238E27FC236}">
+                <a16:creationId xmlns:a16="http://schemas.microsoft.com/office/drawing/2014/main" id="{5E4817F0-88B5-2862-370B-F2E1735BC4FD}"/>
               </a:ext>
             </a:extLst>
           </p:cNvPr>
@@ -2875,18 +3368,18 @@
           <a:p>
             <a:pPr lvl="0"/>
             <a:r>
-              <a:rPr lang="en-US" altLang="zh-CN"/>
-              <a:t>Click to edit Master text styles</a:t>
-            </a:r>
-          </a:p>
-        </p:txBody>
-      </p:sp>
-      <p:sp>
-        <p:nvSpPr>
-          <p:cNvPr id="5" name="Date Placeholder 4">
-            <a:extLst>
-              <a:ext uri="{FF2B5EF4-FFF2-40B4-BE49-F238E27FC236}">
-                <a16:creationId xmlns:a16="http://schemas.microsoft.com/office/drawing/2014/main" id="{F1DF8D54-8C88-40FA-BA51-64D2E92B929E}"/>
+              <a:rPr lang="de-DE"/>
+              <a:t>Mastertextformat bearbeiten</a:t>
+            </a:r>
+          </a:p>
+        </p:txBody>
+      </p:sp>
+      <p:sp>
+        <p:nvSpPr>
+          <p:cNvPr id="5" name="Datumsplatzhalter 4">
+            <a:extLst>
+              <a:ext uri="{FF2B5EF4-FFF2-40B4-BE49-F238E27FC236}">
+                <a16:creationId xmlns:a16="http://schemas.microsoft.com/office/drawing/2014/main" id="{F2F75D83-BDEE-419E-C849-043B88C9D23D}"/>
               </a:ext>
             </a:extLst>
           </p:cNvPr>
@@ -2902,20 +3395,20 @@
           <a:bodyPr/>
           <a:lstStyle/>
           <a:p>
-            <a:fld id="{6F9AC78F-69F7-4DFA-9ED3-63209FEF1CF3}" type="datetimeFigureOut">
-              <a:rPr lang="zh-CN" altLang="en-US" smtClean="0"/>
-              <a:t>2020/6/22</a:t>
+            <a:fld id="{D3377326-B63D-4862-9B98-380EE10FA03E}" type="datetimeFigureOut">
+              <a:rPr lang="en-US" smtClean="0"/>
+              <a:t>7/12/2025</a:t>
             </a:fld>
-            <a:endParaRPr lang="zh-CN" altLang="en-US"/>
-          </a:p>
-        </p:txBody>
-      </p:sp>
-      <p:sp>
-        <p:nvSpPr>
-          <p:cNvPr id="6" name="Footer Placeholder 5">
-            <a:extLst>
-              <a:ext uri="{FF2B5EF4-FFF2-40B4-BE49-F238E27FC236}">
-                <a16:creationId xmlns:a16="http://schemas.microsoft.com/office/drawing/2014/main" id="{8EB32EAD-BF07-4695-9A93-BBC1F71197E6}"/>
+            <a:endParaRPr lang="en-US"/>
+          </a:p>
+        </p:txBody>
+      </p:sp>
+      <p:sp>
+        <p:nvSpPr>
+          <p:cNvPr id="6" name="Fußzeilenplatzhalter 5">
+            <a:extLst>
+              <a:ext uri="{FF2B5EF4-FFF2-40B4-BE49-F238E27FC236}">
+                <a16:creationId xmlns:a16="http://schemas.microsoft.com/office/drawing/2014/main" id="{7D30F855-7C29-A5DD-7053-315215791E1A}"/>
               </a:ext>
             </a:extLst>
           </p:cNvPr>
@@ -2931,16 +3424,16 @@
           <a:bodyPr/>
           <a:lstStyle/>
           <a:p>
-            <a:endParaRPr lang="zh-CN" altLang="en-US"/>
-          </a:p>
-        </p:txBody>
-      </p:sp>
-      <p:sp>
-        <p:nvSpPr>
-          <p:cNvPr id="7" name="Slide Number Placeholder 6">
-            <a:extLst>
-              <a:ext uri="{FF2B5EF4-FFF2-40B4-BE49-F238E27FC236}">
-                <a16:creationId xmlns:a16="http://schemas.microsoft.com/office/drawing/2014/main" id="{571E691B-E260-4840-954F-5F0A099B01C2}"/>
+            <a:endParaRPr lang="en-US"/>
+          </a:p>
+        </p:txBody>
+      </p:sp>
+      <p:sp>
+        <p:nvSpPr>
+          <p:cNvPr id="7" name="Foliennummernplatzhalter 6">
+            <a:extLst>
+              <a:ext uri="{FF2B5EF4-FFF2-40B4-BE49-F238E27FC236}">
+                <a16:creationId xmlns:a16="http://schemas.microsoft.com/office/drawing/2014/main" id="{2570DD33-0172-47D4-147B-79DE4992693D}"/>
               </a:ext>
             </a:extLst>
           </p:cNvPr>
@@ -2956,18 +3449,18 @@
           <a:bodyPr/>
           <a:lstStyle/>
           <a:p>
-            <a:fld id="{50E98428-D87D-43E4-BBCA-B5FD8296FA72}" type="slidenum">
-              <a:rPr lang="zh-CN" altLang="en-US" smtClean="0"/>
-              <a:t>‹#›</a:t>
+            <a:fld id="{7A215391-53CE-46CA-B8DB-791AAC6E5119}" type="slidenum">
+              <a:rPr lang="en-US" smtClean="0"/>
+              <a:t>‹Nr.›</a:t>
             </a:fld>
-            <a:endParaRPr lang="zh-CN" altLang="en-US"/>
+            <a:endParaRPr lang="en-US"/>
           </a:p>
         </p:txBody>
       </p:sp>
     </p:spTree>
     <p:extLst>
       <p:ext uri="{BB962C8B-B14F-4D97-AF65-F5344CB8AC3E}">
-        <p14:creationId xmlns:p14="http://schemas.microsoft.com/office/powerpoint/2010/main" val="3555422995"/>
+        <p14:creationId xmlns:p14="http://schemas.microsoft.com/office/powerpoint/2010/main" val="150938837"/>
       </p:ext>
     </p:extLst>
   </p:cSld>
@@ -2979,7 +3472,7 @@
 
 <file path=ppt/slideLayouts/slideLayout9.xml><?xml version="1.0" encoding="utf-8"?>
 <p:sldLayout xmlns:a="http://schemas.openxmlformats.org/drawingml/2006/main" xmlns:r="http://schemas.openxmlformats.org/officeDocument/2006/relationships" xmlns:p="http://schemas.openxmlformats.org/presentationml/2006/main" type="picTx" preserve="1">
-  <p:cSld name="Picture with Caption">
+  <p:cSld name="Bild mit Überschrift">
     <p:spTree>
       <p:nvGrpSpPr>
         <p:cNvPr id="1" name=""/>
@@ -2996,10 +3489,10 @@
       </p:grpSpPr>
       <p:sp>
         <p:nvSpPr>
-          <p:cNvPr id="2" name="Title 1">
-            <a:extLst>
-              <a:ext uri="{FF2B5EF4-FFF2-40B4-BE49-F238E27FC236}">
-                <a16:creationId xmlns:a16="http://schemas.microsoft.com/office/drawing/2014/main" id="{C0719DEC-C1CA-42B2-8CDF-229DE4705AFF}"/>
+          <p:cNvPr id="2" name="Titel 1">
+            <a:extLst>
+              <a:ext uri="{FF2B5EF4-FFF2-40B4-BE49-F238E27FC236}">
+                <a16:creationId xmlns:a16="http://schemas.microsoft.com/office/drawing/2014/main" id="{3564EA1A-B0B2-34B1-038E-C006E71068FE}"/>
               </a:ext>
             </a:extLst>
           </p:cNvPr>
@@ -3025,19 +3518,19 @@
           </a:lstStyle>
           <a:p>
             <a:r>
-              <a:rPr lang="en-US" altLang="zh-CN"/>
-              <a:t>Click to edit Master title style</a:t>
-            </a:r>
-            <a:endParaRPr lang="zh-CN" altLang="en-US"/>
-          </a:p>
-        </p:txBody>
-      </p:sp>
-      <p:sp>
-        <p:nvSpPr>
-          <p:cNvPr id="3" name="Picture Placeholder 2">
-            <a:extLst>
-              <a:ext uri="{FF2B5EF4-FFF2-40B4-BE49-F238E27FC236}">
-                <a16:creationId xmlns:a16="http://schemas.microsoft.com/office/drawing/2014/main" id="{573B8CE8-7CCC-43C1-B218-80CE5913251F}"/>
+              <a:rPr lang="de-DE"/>
+              <a:t>Mastertitelformat bearbeiten</a:t>
+            </a:r>
+            <a:endParaRPr lang="en-US"/>
+          </a:p>
+        </p:txBody>
+      </p:sp>
+      <p:sp>
+        <p:nvSpPr>
+          <p:cNvPr id="3" name="Bildplatzhalter 2">
+            <a:extLst>
+              <a:ext uri="{FF2B5EF4-FFF2-40B4-BE49-F238E27FC236}">
+                <a16:creationId xmlns:a16="http://schemas.microsoft.com/office/drawing/2014/main" id="{77BAAB9A-DA37-88FC-2BAC-C1D4F1C00C82}"/>
               </a:ext>
             </a:extLst>
           </p:cNvPr>
@@ -3095,16 +3588,16 @@
             </a:lvl9pPr>
           </a:lstStyle>
           <a:p>
-            <a:endParaRPr lang="zh-CN" altLang="en-US"/>
-          </a:p>
-        </p:txBody>
-      </p:sp>
-      <p:sp>
-        <p:nvSpPr>
-          <p:cNvPr id="4" name="Text Placeholder 3">
-            <a:extLst>
-              <a:ext uri="{FF2B5EF4-FFF2-40B4-BE49-F238E27FC236}">
-                <a16:creationId xmlns:a16="http://schemas.microsoft.com/office/drawing/2014/main" id="{5A4AD82F-A8B4-426E-B30A-8EB29817D6E1}"/>
+            <a:endParaRPr lang="en-US"/>
+          </a:p>
+        </p:txBody>
+      </p:sp>
+      <p:sp>
+        <p:nvSpPr>
+          <p:cNvPr id="4" name="Textplatzhalter 3">
+            <a:extLst>
+              <a:ext uri="{FF2B5EF4-FFF2-40B4-BE49-F238E27FC236}">
+                <a16:creationId xmlns:a16="http://schemas.microsoft.com/office/drawing/2014/main" id="{86471BC8-B69E-B6DE-4BC8-D8058D5CAD5C}"/>
               </a:ext>
             </a:extLst>
           </p:cNvPr>
@@ -3164,18 +3657,18 @@
           <a:p>
             <a:pPr lvl="0"/>
             <a:r>
-              <a:rPr lang="en-US" altLang="zh-CN"/>
-              <a:t>Click to edit Master text styles</a:t>
-            </a:r>
-          </a:p>
-        </p:txBody>
-      </p:sp>
-      <p:sp>
-        <p:nvSpPr>
-          <p:cNvPr id="5" name="Date Placeholder 4">
-            <a:extLst>
-              <a:ext uri="{FF2B5EF4-FFF2-40B4-BE49-F238E27FC236}">
-                <a16:creationId xmlns:a16="http://schemas.microsoft.com/office/drawing/2014/main" id="{158775AC-D5A5-440E-9668-AEBA450A703B}"/>
+              <a:rPr lang="de-DE"/>
+              <a:t>Mastertextformat bearbeiten</a:t>
+            </a:r>
+          </a:p>
+        </p:txBody>
+      </p:sp>
+      <p:sp>
+        <p:nvSpPr>
+          <p:cNvPr id="5" name="Datumsplatzhalter 4">
+            <a:extLst>
+              <a:ext uri="{FF2B5EF4-FFF2-40B4-BE49-F238E27FC236}">
+                <a16:creationId xmlns:a16="http://schemas.microsoft.com/office/drawing/2014/main" id="{90E8508F-9360-ACF5-8CDC-E0D9E90CE53A}"/>
               </a:ext>
             </a:extLst>
           </p:cNvPr>
@@ -3191,20 +3684,20 @@
           <a:bodyPr/>
           <a:lstStyle/>
           <a:p>
-            <a:fld id="{6F9AC78F-69F7-4DFA-9ED3-63209FEF1CF3}" type="datetimeFigureOut">
-              <a:rPr lang="zh-CN" altLang="en-US" smtClean="0"/>
-              <a:t>2020/6/22</a:t>
+            <a:fld id="{D3377326-B63D-4862-9B98-380EE10FA03E}" type="datetimeFigureOut">
+              <a:rPr lang="en-US" smtClean="0"/>
+              <a:t>7/12/2025</a:t>
             </a:fld>
-            <a:endParaRPr lang="zh-CN" altLang="en-US"/>
-          </a:p>
-        </p:txBody>
-      </p:sp>
-      <p:sp>
-        <p:nvSpPr>
-          <p:cNvPr id="6" name="Footer Placeholder 5">
-            <a:extLst>
-              <a:ext uri="{FF2B5EF4-FFF2-40B4-BE49-F238E27FC236}">
-                <a16:creationId xmlns:a16="http://schemas.microsoft.com/office/drawing/2014/main" id="{A1601E69-B654-4ABA-9D25-8665DE04B97D}"/>
+            <a:endParaRPr lang="en-US"/>
+          </a:p>
+        </p:txBody>
+      </p:sp>
+      <p:sp>
+        <p:nvSpPr>
+          <p:cNvPr id="6" name="Fußzeilenplatzhalter 5">
+            <a:extLst>
+              <a:ext uri="{FF2B5EF4-FFF2-40B4-BE49-F238E27FC236}">
+                <a16:creationId xmlns:a16="http://schemas.microsoft.com/office/drawing/2014/main" id="{0A3E1A3A-09FD-3A69-38F2-185AD7A38CFB}"/>
               </a:ext>
             </a:extLst>
           </p:cNvPr>
@@ -3220,16 +3713,16 @@
           <a:bodyPr/>
           <a:lstStyle/>
           <a:p>
-            <a:endParaRPr lang="zh-CN" altLang="en-US"/>
-          </a:p>
-        </p:txBody>
-      </p:sp>
-      <p:sp>
-        <p:nvSpPr>
-          <p:cNvPr id="7" name="Slide Number Placeholder 6">
-            <a:extLst>
-              <a:ext uri="{FF2B5EF4-FFF2-40B4-BE49-F238E27FC236}">
-                <a16:creationId xmlns:a16="http://schemas.microsoft.com/office/drawing/2014/main" id="{A48EF834-614E-4ABE-AAC1-B653C5F12563}"/>
+            <a:endParaRPr lang="en-US"/>
+          </a:p>
+        </p:txBody>
+      </p:sp>
+      <p:sp>
+        <p:nvSpPr>
+          <p:cNvPr id="7" name="Foliennummernplatzhalter 6">
+            <a:extLst>
+              <a:ext uri="{FF2B5EF4-FFF2-40B4-BE49-F238E27FC236}">
+                <a16:creationId xmlns:a16="http://schemas.microsoft.com/office/drawing/2014/main" id="{5B5D7F95-631B-F6A3-CC02-4BB408BD71CB}"/>
               </a:ext>
             </a:extLst>
           </p:cNvPr>
@@ -3245,18 +3738,18 @@
           <a:bodyPr/>
           <a:lstStyle/>
           <a:p>
-            <a:fld id="{50E98428-D87D-43E4-BBCA-B5FD8296FA72}" type="slidenum">
-              <a:rPr lang="zh-CN" altLang="en-US" smtClean="0"/>
-              <a:t>‹#›</a:t>
+            <a:fld id="{7A215391-53CE-46CA-B8DB-791AAC6E5119}" type="slidenum">
+              <a:rPr lang="en-US" smtClean="0"/>
+              <a:t>‹Nr.›</a:t>
             </a:fld>
-            <a:endParaRPr lang="zh-CN" altLang="en-US"/>
+            <a:endParaRPr lang="en-US"/>
           </a:p>
         </p:txBody>
       </p:sp>
     </p:spTree>
     <p:extLst>
       <p:ext uri="{BB962C8B-B14F-4D97-AF65-F5344CB8AC3E}">
-        <p14:creationId xmlns:p14="http://schemas.microsoft.com/office/powerpoint/2010/main" val="1636917336"/>
+        <p14:creationId xmlns:p14="http://schemas.microsoft.com/office/powerpoint/2010/main" val="145892616"/>
       </p:ext>
     </p:extLst>
   </p:cSld>
@@ -3290,10 +3783,10 @@
       </p:grpSpPr>
       <p:sp>
         <p:nvSpPr>
-          <p:cNvPr id="2" name="Title Placeholder 1">
-            <a:extLst>
-              <a:ext uri="{FF2B5EF4-FFF2-40B4-BE49-F238E27FC236}">
-                <a16:creationId xmlns:a16="http://schemas.microsoft.com/office/drawing/2014/main" id="{74E3BD97-46DE-4478-A7C8-FD1666F49BA3}"/>
+          <p:cNvPr id="2" name="Titelplatzhalter 1">
+            <a:extLst>
+              <a:ext uri="{FF2B5EF4-FFF2-40B4-BE49-F238E27FC236}">
+                <a16:creationId xmlns:a16="http://schemas.microsoft.com/office/drawing/2014/main" id="{F323108E-17ED-2CCD-77BB-3C5FE8D2993F}"/>
               </a:ext>
             </a:extLst>
           </p:cNvPr>
@@ -3320,19 +3813,19 @@
           <a:lstStyle/>
           <a:p>
             <a:r>
-              <a:rPr lang="en-US" altLang="zh-CN"/>
-              <a:t>Click to edit Master title style</a:t>
-            </a:r>
-            <a:endParaRPr lang="zh-CN" altLang="en-US"/>
-          </a:p>
-        </p:txBody>
-      </p:sp>
-      <p:sp>
-        <p:nvSpPr>
-          <p:cNvPr id="3" name="Text Placeholder 2">
-            <a:extLst>
-              <a:ext uri="{FF2B5EF4-FFF2-40B4-BE49-F238E27FC236}">
-                <a16:creationId xmlns:a16="http://schemas.microsoft.com/office/drawing/2014/main" id="{DD98E71C-E504-41ED-BA74-01427D926DC6}"/>
+              <a:rPr lang="de-DE"/>
+              <a:t>Mastertitelformat bearbeiten</a:t>
+            </a:r>
+            <a:endParaRPr lang="en-US"/>
+          </a:p>
+        </p:txBody>
+      </p:sp>
+      <p:sp>
+        <p:nvSpPr>
+          <p:cNvPr id="3" name="Textplatzhalter 2">
+            <a:extLst>
+              <a:ext uri="{FF2B5EF4-FFF2-40B4-BE49-F238E27FC236}">
+                <a16:creationId xmlns:a16="http://schemas.microsoft.com/office/drawing/2014/main" id="{B2BE9B8C-1B11-482D-CC40-BD1DFA6FA9BC}"/>
               </a:ext>
             </a:extLst>
           </p:cNvPr>
@@ -3360,47 +3853,47 @@
           <a:p>
             <a:pPr lvl="0"/>
             <a:r>
-              <a:rPr lang="en-US" altLang="zh-CN"/>
-              <a:t>Click to edit Master text styles</a:t>
+              <a:rPr lang="de-DE"/>
+              <a:t>Mastertextformat bearbeiten</a:t>
             </a:r>
           </a:p>
           <a:p>
             <a:pPr lvl="1"/>
             <a:r>
-              <a:rPr lang="en-US" altLang="zh-CN"/>
-              <a:t>Second level</a:t>
+              <a:rPr lang="de-DE"/>
+              <a:t>Zweite Ebene</a:t>
             </a:r>
           </a:p>
           <a:p>
             <a:pPr lvl="2"/>
             <a:r>
-              <a:rPr lang="en-US" altLang="zh-CN"/>
-              <a:t>Third level</a:t>
+              <a:rPr lang="de-DE"/>
+              <a:t>Dritte Ebene</a:t>
             </a:r>
           </a:p>
           <a:p>
             <a:pPr lvl="3"/>
             <a:r>
-              <a:rPr lang="en-US" altLang="zh-CN"/>
-              <a:t>Fourth level</a:t>
+              <a:rPr lang="de-DE"/>
+              <a:t>Vierte Ebene</a:t>
             </a:r>
           </a:p>
           <a:p>
             <a:pPr lvl="4"/>
             <a:r>
-              <a:rPr lang="en-US" altLang="zh-CN"/>
-              <a:t>Fifth level</a:t>
-            </a:r>
-            <a:endParaRPr lang="zh-CN" altLang="en-US"/>
-          </a:p>
-        </p:txBody>
-      </p:sp>
-      <p:sp>
-        <p:nvSpPr>
-          <p:cNvPr id="4" name="Date Placeholder 3">
-            <a:extLst>
-              <a:ext uri="{FF2B5EF4-FFF2-40B4-BE49-F238E27FC236}">
-                <a16:creationId xmlns:a16="http://schemas.microsoft.com/office/drawing/2014/main" id="{07C05D13-2FE2-49B4-B651-D010448C3196}"/>
+              <a:rPr lang="de-DE"/>
+              <a:t>Fünfte Ebene</a:t>
+            </a:r>
+            <a:endParaRPr lang="en-US"/>
+          </a:p>
+        </p:txBody>
+      </p:sp>
+      <p:sp>
+        <p:nvSpPr>
+          <p:cNvPr id="4" name="Datumsplatzhalter 3">
+            <a:extLst>
+              <a:ext uri="{FF2B5EF4-FFF2-40B4-BE49-F238E27FC236}">
+                <a16:creationId xmlns:a16="http://schemas.microsoft.com/office/drawing/2014/main" id="{2DDC15BE-8BF3-395E-A652-6785B1227E79}"/>
               </a:ext>
             </a:extLst>
           </p:cNvPr>
@@ -3427,27 +3920,27 @@
               <a:defRPr sz="1200">
                 <a:solidFill>
                   <a:schemeClr val="tx1">
-                    <a:tint val="75000"/>
+                    <a:tint val="82000"/>
                   </a:schemeClr>
                 </a:solidFill>
               </a:defRPr>
             </a:lvl1pPr>
           </a:lstStyle>
           <a:p>
-            <a:fld id="{6F9AC78F-69F7-4DFA-9ED3-63209FEF1CF3}" type="datetimeFigureOut">
-              <a:rPr lang="zh-CN" altLang="en-US" smtClean="0"/>
-              <a:t>2020/6/22</a:t>
+            <a:fld id="{D3377326-B63D-4862-9B98-380EE10FA03E}" type="datetimeFigureOut">
+              <a:rPr lang="en-US" smtClean="0"/>
+              <a:t>7/12/2025</a:t>
             </a:fld>
-            <a:endParaRPr lang="zh-CN" altLang="en-US"/>
-          </a:p>
-        </p:txBody>
-      </p:sp>
-      <p:sp>
-        <p:nvSpPr>
-          <p:cNvPr id="5" name="Footer Placeholder 4">
-            <a:extLst>
-              <a:ext uri="{FF2B5EF4-FFF2-40B4-BE49-F238E27FC236}">
-                <a16:creationId xmlns:a16="http://schemas.microsoft.com/office/drawing/2014/main" id="{83459F73-BF36-4CFB-BDBF-AAE9BB93AB7F}"/>
+            <a:endParaRPr lang="en-US"/>
+          </a:p>
+        </p:txBody>
+      </p:sp>
+      <p:sp>
+        <p:nvSpPr>
+          <p:cNvPr id="5" name="Fußzeilenplatzhalter 4">
+            <a:extLst>
+              <a:ext uri="{FF2B5EF4-FFF2-40B4-BE49-F238E27FC236}">
+                <a16:creationId xmlns:a16="http://schemas.microsoft.com/office/drawing/2014/main" id="{BE373AD3-5211-5B51-3816-336042A40C9F}"/>
               </a:ext>
             </a:extLst>
           </p:cNvPr>
@@ -3474,23 +3967,23 @@
               <a:defRPr sz="1200">
                 <a:solidFill>
                   <a:schemeClr val="tx1">
-                    <a:tint val="75000"/>
+                    <a:tint val="82000"/>
                   </a:schemeClr>
                 </a:solidFill>
               </a:defRPr>
             </a:lvl1pPr>
           </a:lstStyle>
           <a:p>
-            <a:endParaRPr lang="zh-CN" altLang="en-US"/>
-          </a:p>
-        </p:txBody>
-      </p:sp>
-      <p:sp>
-        <p:nvSpPr>
-          <p:cNvPr id="6" name="Slide Number Placeholder 5">
-            <a:extLst>
-              <a:ext uri="{FF2B5EF4-FFF2-40B4-BE49-F238E27FC236}">
-                <a16:creationId xmlns:a16="http://schemas.microsoft.com/office/drawing/2014/main" id="{DF4B0DC1-9EE3-425F-8AFD-E92C85CDFDDF}"/>
+            <a:endParaRPr lang="en-US"/>
+          </a:p>
+        </p:txBody>
+      </p:sp>
+      <p:sp>
+        <p:nvSpPr>
+          <p:cNvPr id="6" name="Foliennummernplatzhalter 5">
+            <a:extLst>
+              <a:ext uri="{FF2B5EF4-FFF2-40B4-BE49-F238E27FC236}">
+                <a16:creationId xmlns:a16="http://schemas.microsoft.com/office/drawing/2014/main" id="{9D456B4B-37D7-0F90-036A-D886F9957BD3}"/>
               </a:ext>
             </a:extLst>
           </p:cNvPr>
@@ -3517,25 +4010,25 @@
               <a:defRPr sz="1200">
                 <a:solidFill>
                   <a:schemeClr val="tx1">
-                    <a:tint val="75000"/>
+                    <a:tint val="82000"/>
                   </a:schemeClr>
                 </a:solidFill>
               </a:defRPr>
             </a:lvl1pPr>
           </a:lstStyle>
           <a:p>
-            <a:fld id="{50E98428-D87D-43E4-BBCA-B5FD8296FA72}" type="slidenum">
-              <a:rPr lang="zh-CN" altLang="en-US" smtClean="0"/>
-              <a:t>‹#›</a:t>
+            <a:fld id="{7A215391-53CE-46CA-B8DB-791AAC6E5119}" type="slidenum">
+              <a:rPr lang="en-US" smtClean="0"/>
+              <a:t>‹Nr.›</a:t>
             </a:fld>
-            <a:endParaRPr lang="zh-CN" altLang="en-US"/>
+            <a:endParaRPr lang="en-US"/>
           </a:p>
         </p:txBody>
       </p:sp>
     </p:spTree>
     <p:extLst>
       <p:ext uri="{BB962C8B-B14F-4D97-AF65-F5344CB8AC3E}">
-        <p14:creationId xmlns:p14="http://schemas.microsoft.com/office/powerpoint/2010/main" val="3117423716"/>
+        <p14:creationId xmlns:p14="http://schemas.microsoft.com/office/powerpoint/2010/main" val="3823477212"/>
       </p:ext>
     </p:extLst>
   </p:cSld>
@@ -3739,7 +4232,7 @@
     </p:bodyStyle>
     <p:otherStyle>
       <a:defPPr>
-        <a:defRPr lang="zh-CN"/>
+        <a:defRPr lang="en-US"/>
       </a:defPPr>
       <a:lvl1pPr marL="0" algn="l" defTabSz="914400" rtl="0" eaLnBrk="1" latinLnBrk="0" hangingPunct="1">
         <a:defRPr sz="1800" kern="1200">
@@ -3841,9 +4334,35 @@
   <p:cSld>
     <p:bg>
       <p:bgPr>
-        <a:solidFill>
-          <a:schemeClr val="accent6"/>
-        </a:solidFill>
+        <a:gradFill>
+          <a:gsLst>
+            <a:gs pos="0">
+              <a:schemeClr val="accent1">
+                <a:lumMod val="5000"/>
+                <a:lumOff val="95000"/>
+              </a:schemeClr>
+            </a:gs>
+            <a:gs pos="74000">
+              <a:schemeClr val="accent1">
+                <a:lumMod val="45000"/>
+                <a:lumOff val="55000"/>
+              </a:schemeClr>
+            </a:gs>
+            <a:gs pos="83000">
+              <a:schemeClr val="accent1">
+                <a:lumMod val="45000"/>
+                <a:lumOff val="55000"/>
+              </a:schemeClr>
+            </a:gs>
+            <a:gs pos="100000">
+              <a:schemeClr val="accent1">
+                <a:lumMod val="30000"/>
+                <a:lumOff val="70000"/>
+              </a:schemeClr>
+            </a:gs>
+          </a:gsLst>
+          <a:lin ang="5400000" scaled="1"/>
+        </a:gradFill>
         <a:effectLst/>
       </p:bgPr>
     </p:bg>
@@ -3863,10 +4382,10 @@
       </p:grpSpPr>
       <p:graphicFrame>
         <p:nvGraphicFramePr>
-          <p:cNvPr id="4" name="차트 5">
-            <a:extLst>
-              <a:ext uri="{FF2B5EF4-FFF2-40B4-BE49-F238E27FC236}">
-                <a16:creationId xmlns:a16="http://schemas.microsoft.com/office/drawing/2014/main" id="{DB2FE7BC-23EB-461C-AF75-B6217D7A4973}"/>
+          <p:cNvPr id="6" name="Diagramm 5">
+            <a:extLst>
+              <a:ext uri="{FF2B5EF4-FFF2-40B4-BE49-F238E27FC236}">
+                <a16:creationId xmlns:a16="http://schemas.microsoft.com/office/drawing/2014/main" id="{F5A86C24-08AF-9F7A-6BDA-A4136486A8D8}"/>
               </a:ext>
             </a:extLst>
           </p:cNvPr>
@@ -3874,14 +4393,14 @@
           <p:nvPr>
             <p:extLst>
               <p:ext uri="{D42A27DB-BD31-4B8C-83A1-F6EECF244321}">
-                <p14:modId xmlns:p14="http://schemas.microsoft.com/office/powerpoint/2010/main" val="2433249326"/>
+                <p14:modId xmlns:p14="http://schemas.microsoft.com/office/powerpoint/2010/main" val="2704779706"/>
               </p:ext>
             </p:extLst>
           </p:nvPr>
         </p:nvGraphicFramePr>
         <p:xfrm>
-          <a:off x="777772" y="1355075"/>
-          <a:ext cx="7328036" cy="2800852"/>
+          <a:off x="2032000" y="719666"/>
+          <a:ext cx="8128000" cy="5418667"/>
         </p:xfrm>
         <a:graphic>
           <a:graphicData uri="http://schemas.openxmlformats.org/drawingml/2006/chart">
@@ -3892,7 +4411,7 @@
     </p:spTree>
     <p:extLst>
       <p:ext uri="{BB962C8B-B14F-4D97-AF65-F5344CB8AC3E}">
-        <p14:creationId xmlns:p14="http://schemas.microsoft.com/office/powerpoint/2010/main" val="3549477711"/>
+        <p14:creationId xmlns:p14="http://schemas.microsoft.com/office/powerpoint/2010/main" val="3010490878"/>
       </p:ext>
     </p:extLst>
   </p:cSld>
@@ -3903,7 +4422,7 @@
 </file>
 
 <file path=ppt/theme/theme1.xml><?xml version="1.0" encoding="utf-8"?>
-<a:theme xmlns:a="http://schemas.openxmlformats.org/drawingml/2006/main" name="Office Theme">
+<a:theme xmlns:a="http://schemas.openxmlformats.org/drawingml/2006/main" name="Office">
   <a:themeElements>
     <a:clrScheme name="Office">
       <a:dk1>
@@ -3913,39 +4432,39 @@
         <a:sysClr val="window" lastClr="FFFFFF"/>
       </a:lt1>
       <a:dk2>
-        <a:srgbClr val="44546A"/>
+        <a:srgbClr val="0E2841"/>
       </a:dk2>
       <a:lt2>
-        <a:srgbClr val="E7E6E6"/>
+        <a:srgbClr val="E8E8E8"/>
       </a:lt2>
       <a:accent1>
-        <a:srgbClr val="4472C4"/>
+        <a:srgbClr val="156082"/>
       </a:accent1>
       <a:accent2>
-        <a:srgbClr val="ED7D31"/>
+        <a:srgbClr val="E97132"/>
       </a:accent2>
       <a:accent3>
-        <a:srgbClr val="A5A5A5"/>
+        <a:srgbClr val="196B24"/>
       </a:accent3>
       <a:accent4>
-        <a:srgbClr val="FFC000"/>
+        <a:srgbClr val="0F9ED5"/>
       </a:accent4>
       <a:accent5>
-        <a:srgbClr val="5B9BD5"/>
+        <a:srgbClr val="A02B93"/>
       </a:accent5>
       <a:accent6>
-        <a:srgbClr val="70AD47"/>
+        <a:srgbClr val="4EA72E"/>
       </a:accent6>
       <a:hlink>
-        <a:srgbClr val="0563C1"/>
+        <a:srgbClr val="467886"/>
       </a:hlink>
       <a:folHlink>
-        <a:srgbClr val="954F72"/>
+        <a:srgbClr val="96607D"/>
       </a:folHlink>
     </a:clrScheme>
     <a:fontScheme name="Office">
       <a:majorFont>
-        <a:latin typeface="等线 Light" panose="020F0302020204030204"/>
+        <a:latin typeface="Aptos Display" panose="02110004020202020204"/>
         <a:ea typeface=""/>
         <a:cs typeface=""/>
         <a:font script="Jpan" typeface="游ゴシック Light"/>
@@ -3997,7 +4516,7 @@
         <a:font script="Tfng" typeface="Ebrima"/>
       </a:majorFont>
       <a:minorFont>
-        <a:latin typeface="等线" panose="020F0502020204030204"/>
+        <a:latin typeface="Aptos" panose="02110004020202020204"/>
         <a:ea typeface=""/>
         <a:cs typeface=""/>
         <a:font script="Jpan" typeface="游ゴシック"/>
@@ -4108,13 +4627,6 @@
         </a:gradFill>
       </a:fillStyleLst>
       <a:lnStyleLst>
-        <a:ln w="6350" cap="flat" cmpd="sng" algn="ctr">
-          <a:solidFill>
-            <a:schemeClr val="phClr"/>
-          </a:solidFill>
-          <a:prstDash val="solid"/>
-          <a:miter lim="800000"/>
-        </a:ln>
         <a:ln w="12700" cap="flat" cmpd="sng" algn="ctr">
           <a:solidFill>
             <a:schemeClr val="phClr"/>
@@ -4123,6 +4635,13 @@
           <a:miter lim="800000"/>
         </a:ln>
         <a:ln w="19050" cap="flat" cmpd="sng" algn="ctr">
+          <a:solidFill>
+            <a:schemeClr val="phClr"/>
+          </a:solidFill>
+          <a:prstDash val="solid"/>
+          <a:miter lim="800000"/>
+        </a:ln>
+        <a:ln w="25400" cap="flat" cmpd="sng" algn="ctr">
           <a:solidFill>
             <a:schemeClr val="phClr"/>
           </a:solidFill>
@@ -4187,11 +4706,31 @@
       </a:bgFillStyleLst>
     </a:fmtScheme>
   </a:themeElements>
-  <a:objectDefaults/>
+  <a:objectDefaults>
+    <a:lnDef>
+      <a:spPr/>
+      <a:bodyPr/>
+      <a:lstStyle/>
+      <a:style>
+        <a:lnRef idx="2">
+          <a:schemeClr val="accent1"/>
+        </a:lnRef>
+        <a:fillRef idx="0">
+          <a:schemeClr val="accent1"/>
+        </a:fillRef>
+        <a:effectRef idx="1">
+          <a:schemeClr val="accent1"/>
+        </a:effectRef>
+        <a:fontRef idx="minor">
+          <a:schemeClr val="tx1"/>
+        </a:fontRef>
+      </a:style>
+    </a:lnDef>
+  </a:objectDefaults>
   <a:extraClrSchemeLst/>
   <a:extLst>
     <a:ext uri="{05A4C25C-085E-4340-85A3-A5531E510DB2}">
-      <thm15:themeFamily xmlns:thm15="http://schemas.microsoft.com/office/thememl/2012/main" name="Office Theme" id="{62F939B6-93AF-4DB8-9C6B-D6C7DFDC589F}" vid="{4A3C46E8-61CC-4603-A589-7422A47A8E4A}"/>
+      <thm15:themeFamily xmlns:thm15="http://schemas.microsoft.com/office/thememl/2012/main" name="Office Theme" id="{2E142A2C-CD16-42D6-873A-C26D2A0506FA}" vid="{1BDDFF52-6CD6-40A5-AB3C-68EB2F1E4D0A}"/>
     </a:ext>
   </a:extLst>
 </a:theme>

</xml_diff>